<commit_message>
Adding SQL Files and slight changes to PPTs
</commit_message>
<xml_diff>
--- a/powerpoints/Day_19.pptx
+++ b/powerpoints/Day_19.pptx
@@ -7,13 +7,18 @@
   <p:sldIdLst>
     <p:sldId id="256" r:id="rId2"/>
     <p:sldId id="257" r:id="rId3"/>
-    <p:sldId id="258" r:id="rId4"/>
-    <p:sldId id="259" r:id="rId5"/>
-    <p:sldId id="261" r:id="rId6"/>
-    <p:sldId id="262" r:id="rId7"/>
-    <p:sldId id="260" r:id="rId8"/>
-    <p:sldId id="264" r:id="rId9"/>
-    <p:sldId id="263" r:id="rId10"/>
+    <p:sldId id="308" r:id="rId4"/>
+    <p:sldId id="322" r:id="rId5"/>
+    <p:sldId id="293" r:id="rId6"/>
+    <p:sldId id="258" r:id="rId7"/>
+    <p:sldId id="259" r:id="rId8"/>
+    <p:sldId id="261" r:id="rId9"/>
+    <p:sldId id="262" r:id="rId10"/>
+    <p:sldId id="260" r:id="rId11"/>
+    <p:sldId id="264" r:id="rId12"/>
+    <p:sldId id="263" r:id="rId13"/>
+    <p:sldId id="301" r:id="rId14"/>
+    <p:sldId id="307" r:id="rId15"/>
   </p:sldIdLst>
   <p:sldSz cx="9144000" cy="6858000" type="screen4x3"/>
   <p:notesSz cx="7010400" cy="9296400"/>
@@ -36726,6 +36731,1061 @@
 </p:sld>
 </file>
 
+<file path=ppt/slides/slide10.xml><?xml version="1.0" encoding="utf-8"?>
+<p:sld xmlns:a="http://schemas.openxmlformats.org/drawingml/2006/main" xmlns:r="http://schemas.openxmlformats.org/officeDocument/2006/relationships" xmlns:p="http://schemas.openxmlformats.org/presentationml/2006/main">
+  <p:cSld>
+    <p:spTree>
+      <p:nvGrpSpPr>
+        <p:cNvPr id="1" name=""/>
+        <p:cNvGrpSpPr/>
+        <p:nvPr/>
+      </p:nvGrpSpPr>
+      <p:grpSpPr>
+        <a:xfrm>
+          <a:off x="0" y="0"/>
+          <a:ext cx="0" cy="0"/>
+          <a:chOff x="0" y="0"/>
+          <a:chExt cx="0" cy="0"/>
+        </a:xfrm>
+      </p:grpSpPr>
+      <p:sp>
+        <p:nvSpPr>
+          <p:cNvPr id="2" name="Title 1">
+            <a:extLst>
+              <a:ext uri="{FF2B5EF4-FFF2-40B4-BE49-F238E27FC236}">
+                <a16:creationId xmlns:a16="http://schemas.microsoft.com/office/drawing/2014/main" id="{45425330-57A0-4A2B-A79A-1DDAD21FFC67}"/>
+              </a:ext>
+            </a:extLst>
+          </p:cNvPr>
+          <p:cNvSpPr>
+            <a:spLocks noGrp="1"/>
+          </p:cNvSpPr>
+          <p:nvPr>
+            <p:ph type="title"/>
+          </p:nvPr>
+        </p:nvSpPr>
+        <p:spPr/>
+        <p:txBody>
+          <a:bodyPr/>
+          <a:lstStyle/>
+          <a:p>
+            <a:r>
+              <a:rPr lang="en-US" dirty="0"/>
+              <a:t>Create a Table</a:t>
+            </a:r>
+          </a:p>
+        </p:txBody>
+      </p:sp>
+      <p:sp>
+        <p:nvSpPr>
+          <p:cNvPr id="3" name="Content Placeholder 2">
+            <a:extLst>
+              <a:ext uri="{FF2B5EF4-FFF2-40B4-BE49-F238E27FC236}">
+                <a16:creationId xmlns:a16="http://schemas.microsoft.com/office/drawing/2014/main" id="{78D93E8E-9097-452F-8B38-5310D9A9044E}"/>
+              </a:ext>
+            </a:extLst>
+          </p:cNvPr>
+          <p:cNvSpPr>
+            <a:spLocks noGrp="1"/>
+          </p:cNvSpPr>
+          <p:nvPr>
+            <p:ph idx="1"/>
+          </p:nvPr>
+        </p:nvSpPr>
+        <p:spPr>
+          <a:gradFill flip="none" rotWithShape="1">
+            <a:gsLst>
+              <a:gs pos="0">
+                <a:schemeClr val="accent1">
+                  <a:tint val="66000"/>
+                  <a:satMod val="160000"/>
+                </a:schemeClr>
+              </a:gs>
+              <a:gs pos="50000">
+                <a:schemeClr val="accent1">
+                  <a:tint val="44500"/>
+                  <a:satMod val="160000"/>
+                </a:schemeClr>
+              </a:gs>
+              <a:gs pos="100000">
+                <a:schemeClr val="accent1">
+                  <a:tint val="23500"/>
+                  <a:satMod val="160000"/>
+                </a:schemeClr>
+              </a:gs>
+            </a:gsLst>
+            <a:path path="circle">
+              <a:fillToRect l="50000" t="50000" r="50000" b="50000"/>
+            </a:path>
+            <a:tileRect/>
+          </a:gradFill>
+        </p:spPr>
+        <p:txBody>
+          <a:bodyPr anchor="ctr"/>
+          <a:lstStyle/>
+          <a:p>
+            <a:pPr marL="0" indent="0">
+              <a:buNone/>
+            </a:pPr>
+            <a:r>
+              <a:rPr lang="en-US" dirty="0">
+                <a:latin typeface="Courier New" panose="02070309020205020404" pitchFamily="49" charset="0"/>
+                <a:cs typeface="Courier New" panose="02070309020205020404" pitchFamily="49" charset="0"/>
+              </a:rPr>
+              <a:t>CREATE TABLE students(</a:t>
+            </a:r>
+          </a:p>
+          <a:p>
+            <a:pPr marL="0" indent="0">
+              <a:buNone/>
+            </a:pPr>
+            <a:r>
+              <a:rPr lang="en-US" dirty="0">
+                <a:latin typeface="Courier New" panose="02070309020205020404" pitchFamily="49" charset="0"/>
+                <a:cs typeface="Courier New" panose="02070309020205020404" pitchFamily="49" charset="0"/>
+              </a:rPr>
+              <a:t>	id </a:t>
+            </a:r>
+            <a:r>
+              <a:rPr lang="en-US" dirty="0" err="1">
+                <a:latin typeface="Courier New" panose="02070309020205020404" pitchFamily="49" charset="0"/>
+                <a:cs typeface="Courier New" panose="02070309020205020404" pitchFamily="49" charset="0"/>
+              </a:rPr>
+              <a:t>Bigint</a:t>
+            </a:r>
+            <a:r>
+              <a:rPr lang="en-US" dirty="0">
+                <a:latin typeface="Courier New" panose="02070309020205020404" pitchFamily="49" charset="0"/>
+                <a:cs typeface="Courier New" panose="02070309020205020404" pitchFamily="49" charset="0"/>
+              </a:rPr>
+              <a:t>,</a:t>
+            </a:r>
+          </a:p>
+          <a:p>
+            <a:pPr marL="0" indent="0">
+              <a:buNone/>
+            </a:pPr>
+            <a:r>
+              <a:rPr lang="en-US" dirty="0">
+                <a:latin typeface="Courier New" panose="02070309020205020404" pitchFamily="49" charset="0"/>
+                <a:cs typeface="Courier New" panose="02070309020205020404" pitchFamily="49" charset="0"/>
+              </a:rPr>
+              <a:t>    name VARCHAR (13),</a:t>
+            </a:r>
+          </a:p>
+          <a:p>
+            <a:pPr marL="0" indent="0">
+              <a:buNone/>
+            </a:pPr>
+            <a:r>
+              <a:rPr lang="en-US" dirty="0">
+                <a:latin typeface="Courier New" panose="02070309020205020404" pitchFamily="49" charset="0"/>
+                <a:cs typeface="Courier New" panose="02070309020205020404" pitchFamily="49" charset="0"/>
+              </a:rPr>
+              <a:t>	</a:t>
+            </a:r>
+            <a:r>
+              <a:rPr lang="en-US" dirty="0" err="1">
+                <a:latin typeface="Courier New" panose="02070309020205020404" pitchFamily="49" charset="0"/>
+                <a:cs typeface="Courier New" panose="02070309020205020404" pitchFamily="49" charset="0"/>
+              </a:rPr>
+              <a:t>gpa</a:t>
+            </a:r>
+            <a:r>
+              <a:rPr lang="en-US" dirty="0">
+                <a:latin typeface="Courier New" panose="02070309020205020404" pitchFamily="49" charset="0"/>
+                <a:cs typeface="Courier New" panose="02070309020205020404" pitchFamily="49" charset="0"/>
+              </a:rPr>
+              <a:t> Decimal, </a:t>
+            </a:r>
+          </a:p>
+          <a:p>
+            <a:pPr marL="0" indent="0">
+              <a:buNone/>
+            </a:pPr>
+            <a:r>
+              <a:rPr lang="en-US" dirty="0">
+                <a:latin typeface="Courier New" panose="02070309020205020404" pitchFamily="49" charset="0"/>
+                <a:cs typeface="Courier New" panose="02070309020205020404" pitchFamily="49" charset="0"/>
+              </a:rPr>
+              <a:t>    PRIMARY KEY(id)</a:t>
+            </a:r>
+          </a:p>
+          <a:p>
+            <a:pPr marL="0" indent="0">
+              <a:buNone/>
+            </a:pPr>
+            <a:r>
+              <a:rPr lang="en-US" dirty="0">
+                <a:latin typeface="Courier New" panose="02070309020205020404" pitchFamily="49" charset="0"/>
+                <a:cs typeface="Courier New" panose="02070309020205020404" pitchFamily="49" charset="0"/>
+              </a:rPr>
+              <a:t>)</a:t>
+            </a:r>
+          </a:p>
+        </p:txBody>
+      </p:sp>
+      <p:sp>
+        <p:nvSpPr>
+          <p:cNvPr id="4" name="Slide Number Placeholder 3">
+            <a:extLst>
+              <a:ext uri="{FF2B5EF4-FFF2-40B4-BE49-F238E27FC236}">
+                <a16:creationId xmlns:a16="http://schemas.microsoft.com/office/drawing/2014/main" id="{D3B2FE8F-8A06-4000-B7E7-E145B5D43C32}"/>
+              </a:ext>
+            </a:extLst>
+          </p:cNvPr>
+          <p:cNvSpPr>
+            <a:spLocks noGrp="1"/>
+          </p:cNvSpPr>
+          <p:nvPr>
+            <p:ph type="sldNum" sz="quarter" idx="12"/>
+          </p:nvPr>
+        </p:nvSpPr>
+        <p:spPr/>
+        <p:txBody>
+          <a:bodyPr/>
+          <a:lstStyle/>
+          <a:p>
+            <a:fld id="{F6728BC2-ACA3-447C-A909-F3F49211C066}" type="slidenum">
+              <a:rPr lang="en-US" smtClean="0"/>
+              <a:pPr/>
+              <a:t>9</a:t>
+            </a:fld>
+            <a:endParaRPr lang="en-US" dirty="0"/>
+          </a:p>
+        </p:txBody>
+      </p:sp>
+    </p:spTree>
+    <p:extLst>
+      <p:ext uri="{BB962C8B-B14F-4D97-AF65-F5344CB8AC3E}">
+        <p14:creationId xmlns:p14="http://schemas.microsoft.com/office/powerpoint/2010/main" val="132639717"/>
+      </p:ext>
+    </p:extLst>
+  </p:cSld>
+  <p:clrMapOvr>
+    <a:masterClrMapping/>
+  </p:clrMapOvr>
+</p:sld>
+</file>
+
+<file path=ppt/slides/slide11.xml><?xml version="1.0" encoding="utf-8"?>
+<p:sld xmlns:a="http://schemas.openxmlformats.org/drawingml/2006/main" xmlns:r="http://schemas.openxmlformats.org/officeDocument/2006/relationships" xmlns:p="http://schemas.openxmlformats.org/presentationml/2006/main">
+  <p:cSld>
+    <p:spTree>
+      <p:nvGrpSpPr>
+        <p:cNvPr id="1" name=""/>
+        <p:cNvGrpSpPr/>
+        <p:nvPr/>
+      </p:nvGrpSpPr>
+      <p:grpSpPr>
+        <a:xfrm>
+          <a:off x="0" y="0"/>
+          <a:ext cx="0" cy="0"/>
+          <a:chOff x="0" y="0"/>
+          <a:chExt cx="0" cy="0"/>
+        </a:xfrm>
+      </p:grpSpPr>
+      <p:sp>
+        <p:nvSpPr>
+          <p:cNvPr id="2" name="Title 1">
+            <a:extLst>
+              <a:ext uri="{FF2B5EF4-FFF2-40B4-BE49-F238E27FC236}">
+                <a16:creationId xmlns:a16="http://schemas.microsoft.com/office/drawing/2014/main" id="{480B22A4-F8F5-41CA-9762-66518D4EBD58}"/>
+              </a:ext>
+            </a:extLst>
+          </p:cNvPr>
+          <p:cNvSpPr>
+            <a:spLocks noGrp="1"/>
+          </p:cNvSpPr>
+          <p:nvPr>
+            <p:ph type="title"/>
+          </p:nvPr>
+        </p:nvSpPr>
+        <p:spPr/>
+        <p:txBody>
+          <a:bodyPr/>
+          <a:lstStyle/>
+          <a:p>
+            <a:r>
+              <a:rPr lang="en-US" dirty="0"/>
+              <a:t>Data Definition Language</a:t>
+            </a:r>
+          </a:p>
+        </p:txBody>
+      </p:sp>
+      <p:sp>
+        <p:nvSpPr>
+          <p:cNvPr id="3" name="Content Placeholder 2">
+            <a:extLst>
+              <a:ext uri="{FF2B5EF4-FFF2-40B4-BE49-F238E27FC236}">
+                <a16:creationId xmlns:a16="http://schemas.microsoft.com/office/drawing/2014/main" id="{6448E8AB-E57B-4A0F-AF94-FA3ACB08B04F}"/>
+              </a:ext>
+            </a:extLst>
+          </p:cNvPr>
+          <p:cNvSpPr>
+            <a:spLocks noGrp="1"/>
+          </p:cNvSpPr>
+          <p:nvPr>
+            <p:ph idx="1"/>
+          </p:nvPr>
+        </p:nvSpPr>
+        <p:spPr/>
+        <p:txBody>
+          <a:bodyPr/>
+          <a:lstStyle/>
+          <a:p>
+            <a:r>
+              <a:rPr lang="en-US" dirty="0"/>
+              <a:t>Create </a:t>
+            </a:r>
+          </a:p>
+          <a:p>
+            <a:r>
+              <a:rPr lang="en-US" dirty="0"/>
+              <a:t>Alter</a:t>
+            </a:r>
+          </a:p>
+          <a:p>
+            <a:r>
+              <a:rPr lang="en-US" dirty="0"/>
+              <a:t>Drop</a:t>
+            </a:r>
+          </a:p>
+          <a:p>
+            <a:r>
+              <a:rPr lang="en-US" dirty="0"/>
+              <a:t>Truncate </a:t>
+            </a:r>
+          </a:p>
+          <a:p>
+            <a:r>
+              <a:rPr lang="en-US" dirty="0"/>
+              <a:t>***Rename</a:t>
+            </a:r>
+          </a:p>
+          <a:p>
+            <a:pPr lvl="1"/>
+            <a:r>
+              <a:rPr lang="en-US" dirty="0"/>
+              <a:t>In PostgreSQL just </a:t>
+            </a:r>
+            <a:r>
+              <a:rPr lang="en-US" dirty="0">
+                <a:latin typeface="Courier New" panose="02070309020205020404" pitchFamily="49" charset="0"/>
+                <a:cs typeface="Courier New" panose="02070309020205020404" pitchFamily="49" charset="0"/>
+              </a:rPr>
+              <a:t>ALTER TABLE </a:t>
+            </a:r>
+            <a:r>
+              <a:rPr lang="en-US" i="1" dirty="0">
+                <a:latin typeface="Courier New" panose="02070309020205020404" pitchFamily="49" charset="0"/>
+                <a:cs typeface="Courier New" panose="02070309020205020404" pitchFamily="49" charset="0"/>
+              </a:rPr>
+              <a:t>name </a:t>
+            </a:r>
+            <a:r>
+              <a:rPr lang="en-US" dirty="0">
+                <a:latin typeface="Courier New" panose="02070309020205020404" pitchFamily="49" charset="0"/>
+                <a:cs typeface="Courier New" panose="02070309020205020404" pitchFamily="49" charset="0"/>
+              </a:rPr>
+              <a:t>RENAME TO </a:t>
+            </a:r>
+            <a:r>
+              <a:rPr lang="en-US" i="1" dirty="0" err="1">
+                <a:latin typeface="Courier New" panose="02070309020205020404" pitchFamily="49" charset="0"/>
+                <a:cs typeface="Courier New" panose="02070309020205020404" pitchFamily="49" charset="0"/>
+              </a:rPr>
+              <a:t>new_name</a:t>
+            </a:r>
+            <a:r>
+              <a:rPr lang="en-US" i="1" dirty="0">
+                <a:latin typeface="Courier New" panose="02070309020205020404" pitchFamily="49" charset="0"/>
+                <a:cs typeface="Courier New" panose="02070309020205020404" pitchFamily="49" charset="0"/>
+              </a:rPr>
+              <a:t>;</a:t>
+            </a:r>
+            <a:endParaRPr lang="en-US" dirty="0">
+              <a:latin typeface="Courier New" panose="02070309020205020404" pitchFamily="49" charset="0"/>
+              <a:cs typeface="Courier New" panose="02070309020205020404" pitchFamily="49" charset="0"/>
+            </a:endParaRPr>
+          </a:p>
+          <a:p>
+            <a:r>
+              <a:rPr lang="en-US" dirty="0"/>
+              <a:t>Comment </a:t>
+            </a:r>
+          </a:p>
+          <a:p>
+            <a:endParaRPr lang="en-US" dirty="0"/>
+          </a:p>
+        </p:txBody>
+      </p:sp>
+      <p:sp>
+        <p:nvSpPr>
+          <p:cNvPr id="4" name="Slide Number Placeholder 3">
+            <a:extLst>
+              <a:ext uri="{FF2B5EF4-FFF2-40B4-BE49-F238E27FC236}">
+                <a16:creationId xmlns:a16="http://schemas.microsoft.com/office/drawing/2014/main" id="{DFCD860D-D52C-4DD3-AA21-4964446F48BC}"/>
+              </a:ext>
+            </a:extLst>
+          </p:cNvPr>
+          <p:cNvSpPr>
+            <a:spLocks noGrp="1"/>
+          </p:cNvSpPr>
+          <p:nvPr>
+            <p:ph type="sldNum" sz="quarter" idx="12"/>
+          </p:nvPr>
+        </p:nvSpPr>
+        <p:spPr/>
+        <p:txBody>
+          <a:bodyPr/>
+          <a:lstStyle/>
+          <a:p>
+            <a:fld id="{F6728BC2-ACA3-447C-A909-F3F49211C066}" type="slidenum">
+              <a:rPr lang="en-US" smtClean="0"/>
+              <a:pPr/>
+              <a:t>10</a:t>
+            </a:fld>
+            <a:endParaRPr lang="en-US" dirty="0"/>
+          </a:p>
+        </p:txBody>
+      </p:sp>
+    </p:spTree>
+    <p:extLst>
+      <p:ext uri="{BB962C8B-B14F-4D97-AF65-F5344CB8AC3E}">
+        <p14:creationId xmlns:p14="http://schemas.microsoft.com/office/powerpoint/2010/main" val="2172402417"/>
+      </p:ext>
+    </p:extLst>
+  </p:cSld>
+  <p:clrMapOvr>
+    <a:masterClrMapping/>
+  </p:clrMapOvr>
+</p:sld>
+</file>
+
+<file path=ppt/slides/slide12.xml><?xml version="1.0" encoding="utf-8"?>
+<p:sld xmlns:a="http://schemas.openxmlformats.org/drawingml/2006/main" xmlns:r="http://schemas.openxmlformats.org/officeDocument/2006/relationships" xmlns:p="http://schemas.openxmlformats.org/presentationml/2006/main">
+  <p:cSld>
+    <p:spTree>
+      <p:nvGrpSpPr>
+        <p:cNvPr id="1" name=""/>
+        <p:cNvGrpSpPr/>
+        <p:nvPr/>
+      </p:nvGrpSpPr>
+      <p:grpSpPr>
+        <a:xfrm>
+          <a:off x="0" y="0"/>
+          <a:ext cx="0" cy="0"/>
+          <a:chOff x="0" y="0"/>
+          <a:chExt cx="0" cy="0"/>
+        </a:xfrm>
+      </p:grpSpPr>
+      <p:sp>
+        <p:nvSpPr>
+          <p:cNvPr id="2" name="Title 1">
+            <a:extLst>
+              <a:ext uri="{FF2B5EF4-FFF2-40B4-BE49-F238E27FC236}">
+                <a16:creationId xmlns:a16="http://schemas.microsoft.com/office/drawing/2014/main" id="{7CCF564B-6AEC-4F88-A0FA-37A822D47E94}"/>
+              </a:ext>
+            </a:extLst>
+          </p:cNvPr>
+          <p:cNvSpPr>
+            <a:spLocks noGrp="1"/>
+          </p:cNvSpPr>
+          <p:nvPr>
+            <p:ph type="title"/>
+          </p:nvPr>
+        </p:nvSpPr>
+        <p:spPr/>
+        <p:txBody>
+          <a:bodyPr/>
+          <a:lstStyle/>
+          <a:p>
+            <a:r>
+              <a:rPr lang="en-US" dirty="0"/>
+              <a:t>Helpful Resources </a:t>
+            </a:r>
+            <a:br>
+              <a:rPr lang="en-US" dirty="0"/>
+            </a:br>
+            <a:r>
+              <a:rPr lang="en-US" sz="1200" dirty="0"/>
+              <a:t>(Beyond the documentation)</a:t>
+            </a:r>
+            <a:endParaRPr lang="en-US" dirty="0"/>
+          </a:p>
+        </p:txBody>
+      </p:sp>
+      <p:sp>
+        <p:nvSpPr>
+          <p:cNvPr id="3" name="Content Placeholder 2">
+            <a:extLst>
+              <a:ext uri="{FF2B5EF4-FFF2-40B4-BE49-F238E27FC236}">
+                <a16:creationId xmlns:a16="http://schemas.microsoft.com/office/drawing/2014/main" id="{BDC4863A-943F-449C-A8B3-5AE00BF4E69B}"/>
+              </a:ext>
+            </a:extLst>
+          </p:cNvPr>
+          <p:cNvSpPr>
+            <a:spLocks noGrp="1"/>
+          </p:cNvSpPr>
+          <p:nvPr>
+            <p:ph idx="1"/>
+          </p:nvPr>
+        </p:nvSpPr>
+        <p:spPr/>
+        <p:txBody>
+          <a:bodyPr/>
+          <a:lstStyle/>
+          <a:p>
+            <a:r>
+              <a:rPr lang="en-US" dirty="0">
+                <a:hlinkClick r:id="rId2"/>
+              </a:rPr>
+              <a:t>https://www.techonthenet.com/postgresql/tables/create_table.php</a:t>
+            </a:r>
+            <a:endParaRPr lang="en-US" dirty="0"/>
+          </a:p>
+          <a:p>
+            <a:r>
+              <a:rPr lang="en-US" dirty="0">
+                <a:hlinkClick r:id="rId3"/>
+              </a:rPr>
+              <a:t>https://www.postgresqltutorial.com/</a:t>
+            </a:r>
+            <a:endParaRPr lang="en-US" dirty="0"/>
+          </a:p>
+          <a:p>
+            <a:r>
+              <a:rPr lang="en-US" dirty="0">
+                <a:hlinkClick r:id="rId4"/>
+              </a:rPr>
+              <a:t>https://www.tutorialspoint.com/postgresql/postgresql_syntax.htm</a:t>
+            </a:r>
+            <a:endParaRPr lang="en-US" dirty="0"/>
+          </a:p>
+          <a:p>
+            <a:endParaRPr lang="en-US" dirty="0"/>
+          </a:p>
+        </p:txBody>
+      </p:sp>
+      <p:sp>
+        <p:nvSpPr>
+          <p:cNvPr id="4" name="Slide Number Placeholder 3">
+            <a:extLst>
+              <a:ext uri="{FF2B5EF4-FFF2-40B4-BE49-F238E27FC236}">
+                <a16:creationId xmlns:a16="http://schemas.microsoft.com/office/drawing/2014/main" id="{9FD39B28-D937-4A5F-A13E-28B2D5E73613}"/>
+              </a:ext>
+            </a:extLst>
+          </p:cNvPr>
+          <p:cNvSpPr>
+            <a:spLocks noGrp="1"/>
+          </p:cNvSpPr>
+          <p:nvPr>
+            <p:ph type="sldNum" sz="quarter" idx="12"/>
+          </p:nvPr>
+        </p:nvSpPr>
+        <p:spPr/>
+        <p:txBody>
+          <a:bodyPr/>
+          <a:lstStyle/>
+          <a:p>
+            <a:fld id="{F6728BC2-ACA3-447C-A909-F3F49211C066}" type="slidenum">
+              <a:rPr lang="en-US" smtClean="0"/>
+              <a:pPr/>
+              <a:t>11</a:t>
+            </a:fld>
+            <a:endParaRPr lang="en-US" dirty="0"/>
+          </a:p>
+        </p:txBody>
+      </p:sp>
+    </p:spTree>
+    <p:extLst>
+      <p:ext uri="{BB962C8B-B14F-4D97-AF65-F5344CB8AC3E}">
+        <p14:creationId xmlns:p14="http://schemas.microsoft.com/office/powerpoint/2010/main" val="3858159054"/>
+      </p:ext>
+    </p:extLst>
+  </p:cSld>
+  <p:clrMapOvr>
+    <a:masterClrMapping/>
+  </p:clrMapOvr>
+</p:sld>
+</file>
+
+<file path=ppt/slides/slide13.xml><?xml version="1.0" encoding="utf-8"?>
+<p:sld xmlns:a="http://schemas.openxmlformats.org/drawingml/2006/main" xmlns:r="http://schemas.openxmlformats.org/officeDocument/2006/relationships" xmlns:p="http://schemas.openxmlformats.org/presentationml/2006/main">
+  <p:cSld>
+    <p:spTree>
+      <p:nvGrpSpPr>
+        <p:cNvPr id="1" name=""/>
+        <p:cNvGrpSpPr/>
+        <p:nvPr/>
+      </p:nvGrpSpPr>
+      <p:grpSpPr>
+        <a:xfrm>
+          <a:off x="0" y="0"/>
+          <a:ext cx="0" cy="0"/>
+          <a:chOff x="0" y="0"/>
+          <a:chExt cx="0" cy="0"/>
+        </a:xfrm>
+      </p:grpSpPr>
+      <p:sp>
+        <p:nvSpPr>
+          <p:cNvPr id="2" name="Title 1">
+            <a:extLst>
+              <a:ext uri="{FF2B5EF4-FFF2-40B4-BE49-F238E27FC236}">
+                <a16:creationId xmlns:a16="http://schemas.microsoft.com/office/drawing/2014/main" id="{7D835CB1-FC65-4AC7-83C5-D9E8749D97F2}"/>
+              </a:ext>
+            </a:extLst>
+          </p:cNvPr>
+          <p:cNvSpPr>
+            <a:spLocks noGrp="1"/>
+          </p:cNvSpPr>
+          <p:nvPr>
+            <p:ph type="title"/>
+          </p:nvPr>
+        </p:nvSpPr>
+        <p:spPr/>
+        <p:txBody>
+          <a:bodyPr/>
+          <a:lstStyle/>
+          <a:p>
+            <a:r>
+              <a:rPr lang="en-US" dirty="0"/>
+              <a:t>ERD</a:t>
+            </a:r>
+          </a:p>
+        </p:txBody>
+      </p:sp>
+      <p:sp>
+        <p:nvSpPr>
+          <p:cNvPr id="3" name="Text Placeholder 2">
+            <a:extLst>
+              <a:ext uri="{FF2B5EF4-FFF2-40B4-BE49-F238E27FC236}">
+                <a16:creationId xmlns:a16="http://schemas.microsoft.com/office/drawing/2014/main" id="{C6F51D0E-4D82-4BD3-A377-0C4E3AA74EF7}"/>
+              </a:ext>
+            </a:extLst>
+          </p:cNvPr>
+          <p:cNvSpPr>
+            <a:spLocks noGrp="1"/>
+          </p:cNvSpPr>
+          <p:nvPr>
+            <p:ph type="body" idx="1"/>
+          </p:nvPr>
+        </p:nvSpPr>
+        <p:spPr/>
+        <p:txBody>
+          <a:bodyPr/>
+          <a:lstStyle/>
+          <a:p>
+            <a:r>
+              <a:rPr lang="en-US" dirty="0"/>
+              <a:t>Entity Relationship Diagram</a:t>
+            </a:r>
+          </a:p>
+          <a:p>
+            <a:r>
+              <a:rPr lang="en-US" dirty="0"/>
+              <a:t>Structural diagram used to visually describe the relationships between tables within a database, as well as the structure of the tables.</a:t>
+            </a:r>
+          </a:p>
+          <a:p>
+            <a:r>
+              <a:rPr lang="en-US" dirty="0"/>
+              <a:t>Within an ERD, each table represents a single type of entity.</a:t>
+            </a:r>
+          </a:p>
+          <a:p>
+            <a:endParaRPr lang="en-US" dirty="0"/>
+          </a:p>
+        </p:txBody>
+      </p:sp>
+      <p:sp>
+        <p:nvSpPr>
+          <p:cNvPr id="4" name="Slide Number Placeholder 3">
+            <a:extLst>
+              <a:ext uri="{FF2B5EF4-FFF2-40B4-BE49-F238E27FC236}">
+                <a16:creationId xmlns:a16="http://schemas.microsoft.com/office/drawing/2014/main" id="{7B9A9BDE-83F8-4120-9B0A-D765603A17F4}"/>
+              </a:ext>
+            </a:extLst>
+          </p:cNvPr>
+          <p:cNvSpPr>
+            <a:spLocks noGrp="1"/>
+          </p:cNvSpPr>
+          <p:nvPr>
+            <p:ph type="sldNum" idx="12"/>
+          </p:nvPr>
+        </p:nvSpPr>
+        <p:spPr/>
+        <p:txBody>
+          <a:bodyPr/>
+          <a:lstStyle/>
+          <a:p>
+            <a:pPr marL="0" lvl="0" indent="0" algn="r" rtl="0">
+              <a:spcBef>
+                <a:spcPts val="0"/>
+              </a:spcBef>
+              <a:spcAft>
+                <a:spcPts val="0"/>
+              </a:spcAft>
+              <a:buNone/>
+            </a:pPr>
+            <a:fld id="{00000000-1234-1234-1234-123412341234}" type="slidenum">
+              <a:rPr lang="en-US" smtClean="0"/>
+              <a:t>12</a:t>
+            </a:fld>
+            <a:endParaRPr lang="en-US"/>
+          </a:p>
+        </p:txBody>
+      </p:sp>
+    </p:spTree>
+    <p:extLst>
+      <p:ext uri="{BB962C8B-B14F-4D97-AF65-F5344CB8AC3E}">
+        <p14:creationId xmlns:p14="http://schemas.microsoft.com/office/powerpoint/2010/main" val="3256088197"/>
+      </p:ext>
+    </p:extLst>
+  </p:cSld>
+  <p:clrMapOvr>
+    <a:masterClrMapping/>
+  </p:clrMapOvr>
+</p:sld>
+</file>
+
+<file path=ppt/slides/slide14.xml><?xml version="1.0" encoding="utf-8"?>
+<p:sld xmlns:a="http://schemas.openxmlformats.org/drawingml/2006/main" xmlns:r="http://schemas.openxmlformats.org/officeDocument/2006/relationships" xmlns:p="http://schemas.openxmlformats.org/presentationml/2006/main">
+  <p:cSld>
+    <p:spTree>
+      <p:nvGrpSpPr>
+        <p:cNvPr id="1" name=""/>
+        <p:cNvGrpSpPr/>
+        <p:nvPr/>
+      </p:nvGrpSpPr>
+      <p:grpSpPr>
+        <a:xfrm>
+          <a:off x="0" y="0"/>
+          <a:ext cx="0" cy="0"/>
+          <a:chOff x="0" y="0"/>
+          <a:chExt cx="0" cy="0"/>
+        </a:xfrm>
+      </p:grpSpPr>
+      <p:sp>
+        <p:nvSpPr>
+          <p:cNvPr id="2" name="Title 1">
+            <a:extLst>
+              <a:ext uri="{FF2B5EF4-FFF2-40B4-BE49-F238E27FC236}">
+                <a16:creationId xmlns:a16="http://schemas.microsoft.com/office/drawing/2014/main" id="{7D835CB1-FC65-4AC7-83C5-D9E8749D97F2}"/>
+              </a:ext>
+            </a:extLst>
+          </p:cNvPr>
+          <p:cNvSpPr>
+            <a:spLocks noGrp="1"/>
+          </p:cNvSpPr>
+          <p:nvPr>
+            <p:ph type="title"/>
+          </p:nvPr>
+        </p:nvSpPr>
+        <p:spPr/>
+        <p:txBody>
+          <a:bodyPr/>
+          <a:lstStyle/>
+          <a:p>
+            <a:r>
+              <a:rPr lang="en-US" dirty="0"/>
+              <a:t>ERD</a:t>
+            </a:r>
+          </a:p>
+        </p:txBody>
+      </p:sp>
+      <p:sp>
+        <p:nvSpPr>
+          <p:cNvPr id="4" name="Slide Number Placeholder 3">
+            <a:extLst>
+              <a:ext uri="{FF2B5EF4-FFF2-40B4-BE49-F238E27FC236}">
+                <a16:creationId xmlns:a16="http://schemas.microsoft.com/office/drawing/2014/main" id="{7B9A9BDE-83F8-4120-9B0A-D765603A17F4}"/>
+              </a:ext>
+            </a:extLst>
+          </p:cNvPr>
+          <p:cNvSpPr>
+            <a:spLocks noGrp="1"/>
+          </p:cNvSpPr>
+          <p:nvPr>
+            <p:ph type="sldNum" idx="12"/>
+          </p:nvPr>
+        </p:nvSpPr>
+        <p:spPr/>
+        <p:txBody>
+          <a:bodyPr/>
+          <a:lstStyle/>
+          <a:p>
+            <a:pPr marL="0" lvl="0" indent="0" algn="r" rtl="0">
+              <a:spcBef>
+                <a:spcPts val="0"/>
+              </a:spcBef>
+              <a:spcAft>
+                <a:spcPts val="0"/>
+              </a:spcAft>
+              <a:buNone/>
+            </a:pPr>
+            <a:fld id="{00000000-1234-1234-1234-123412341234}" type="slidenum">
+              <a:rPr lang="en-US" smtClean="0"/>
+              <a:t>13</a:t>
+            </a:fld>
+            <a:endParaRPr lang="en-US"/>
+          </a:p>
+        </p:txBody>
+      </p:sp>
+      <p:pic>
+        <p:nvPicPr>
+          <p:cNvPr id="6" name="Picture 2">
+            <a:extLst>
+              <a:ext uri="{FF2B5EF4-FFF2-40B4-BE49-F238E27FC236}">
+                <a16:creationId xmlns:a16="http://schemas.microsoft.com/office/drawing/2014/main" id="{BA684F94-83A4-4E55-B32C-3589876A5033}"/>
+              </a:ext>
+            </a:extLst>
+          </p:cNvPr>
+          <p:cNvPicPr>
+            <a:picLocks noChangeAspect="1" noChangeArrowheads="1"/>
+          </p:cNvPicPr>
+          <p:nvPr/>
+        </p:nvPicPr>
+        <p:blipFill>
+          <a:blip r:embed="rId2">
+            <a:extLst>
+              <a:ext uri="{28A0092B-C50C-407E-A947-70E740481C1C}">
+                <a14:useLocalDpi xmlns:a14="http://schemas.microsoft.com/office/drawing/2010/main" val="0"/>
+              </a:ext>
+            </a:extLst>
+          </a:blip>
+          <a:srcRect/>
+          <a:stretch>
+            <a:fillRect/>
+          </a:stretch>
+        </p:blipFill>
+        <p:spPr bwMode="auto">
+          <a:xfrm>
+            <a:off x="3769658" y="1724761"/>
+            <a:ext cx="5214770" cy="4627677"/>
+          </a:xfrm>
+          <a:prstGeom prst="rect">
+            <a:avLst/>
+          </a:prstGeom>
+          <a:noFill/>
+          <a:extLst>
+            <a:ext uri="{909E8E84-426E-40DD-AFC4-6F175D3DCCD1}">
+              <a14:hiddenFill xmlns:a14="http://schemas.microsoft.com/office/drawing/2010/main">
+                <a:solidFill>
+                  <a:srgbClr val="FFFFFF"/>
+                </a:solidFill>
+              </a14:hiddenFill>
+            </a:ext>
+          </a:extLst>
+        </p:spPr>
+      </p:pic>
+      <p:sp>
+        <p:nvSpPr>
+          <p:cNvPr id="7" name="Text Placeholder 6">
+            <a:extLst>
+              <a:ext uri="{FF2B5EF4-FFF2-40B4-BE49-F238E27FC236}">
+                <a16:creationId xmlns:a16="http://schemas.microsoft.com/office/drawing/2014/main" id="{E01CC6B1-E0D5-4B16-B569-2603CABA5DD7}"/>
+              </a:ext>
+            </a:extLst>
+          </p:cNvPr>
+          <p:cNvSpPr>
+            <a:spLocks noGrp="1"/>
+          </p:cNvSpPr>
+          <p:nvPr>
+            <p:ph type="body" idx="1"/>
+          </p:nvPr>
+        </p:nvSpPr>
+        <p:spPr>
+          <a:xfrm>
+            <a:off x="0" y="1219200"/>
+            <a:ext cx="3670359" cy="5638800"/>
+          </a:xfrm>
+        </p:spPr>
+        <p:txBody>
+          <a:bodyPr/>
+          <a:lstStyle/>
+          <a:p>
+            <a:r>
+              <a:rPr lang="en-US" sz="1800" dirty="0"/>
+              <a:t>Parents</a:t>
+            </a:r>
+          </a:p>
+          <a:p>
+            <a:pPr lvl="1"/>
+            <a:r>
+              <a:rPr lang="en-US" sz="1400" dirty="0"/>
+              <a:t>PK – </a:t>
+            </a:r>
+            <a:r>
+              <a:rPr lang="en-US" sz="1400" dirty="0" err="1"/>
+              <a:t>parent_id</a:t>
+            </a:r>
+            <a:endParaRPr lang="en-US" sz="1400" dirty="0"/>
+          </a:p>
+          <a:p>
+            <a:pPr lvl="1"/>
+            <a:r>
+              <a:rPr lang="en-US" sz="1400" dirty="0"/>
+              <a:t>FK – </a:t>
+            </a:r>
+            <a:r>
+              <a:rPr lang="en-US" sz="1400" dirty="0" err="1"/>
+              <a:t>student_id</a:t>
+            </a:r>
+            <a:endParaRPr lang="en-US" sz="1400" dirty="0"/>
+          </a:p>
+          <a:p>
+            <a:pPr lvl="1"/>
+            <a:r>
+              <a:rPr lang="en-US" sz="1400" dirty="0"/>
+              <a:t>m:n relationship with Students</a:t>
+            </a:r>
+          </a:p>
+          <a:p>
+            <a:r>
+              <a:rPr lang="en-US" sz="1800" dirty="0"/>
+              <a:t>Students</a:t>
+            </a:r>
+          </a:p>
+          <a:p>
+            <a:pPr lvl="1"/>
+            <a:r>
+              <a:rPr lang="en-US" sz="1400" dirty="0"/>
+              <a:t>PK – </a:t>
+            </a:r>
+            <a:r>
+              <a:rPr lang="en-US" sz="1400" dirty="0" err="1"/>
+              <a:t>student_id</a:t>
+            </a:r>
+            <a:endParaRPr lang="en-US" sz="1400" dirty="0"/>
+          </a:p>
+          <a:p>
+            <a:pPr lvl="1"/>
+            <a:r>
+              <a:rPr lang="en-US" sz="1400" dirty="0"/>
+              <a:t>FK – </a:t>
+            </a:r>
+            <a:r>
+              <a:rPr lang="en-US" sz="1400" dirty="0" err="1"/>
+              <a:t>school_id</a:t>
+            </a:r>
+            <a:endParaRPr lang="en-US" sz="1400" dirty="0"/>
+          </a:p>
+          <a:p>
+            <a:pPr lvl="1"/>
+            <a:r>
+              <a:rPr lang="en-US" sz="1400" dirty="0"/>
+              <a:t>m:n relationship with Parents</a:t>
+            </a:r>
+          </a:p>
+          <a:p>
+            <a:pPr lvl="1"/>
+            <a:r>
+              <a:rPr lang="en-US" sz="1400" dirty="0"/>
+              <a:t>n:1 relationship with Schools</a:t>
+            </a:r>
+          </a:p>
+          <a:p>
+            <a:r>
+              <a:rPr lang="en-US" sz="1800" dirty="0"/>
+              <a:t>Schools</a:t>
+            </a:r>
+          </a:p>
+          <a:p>
+            <a:pPr lvl="1"/>
+            <a:r>
+              <a:rPr lang="en-US" sz="1400" dirty="0"/>
+              <a:t>PK – </a:t>
+            </a:r>
+            <a:r>
+              <a:rPr lang="en-US" sz="1400" dirty="0" err="1"/>
+              <a:t>school_id</a:t>
+            </a:r>
+            <a:endParaRPr lang="en-US" sz="1400" dirty="0"/>
+          </a:p>
+          <a:p>
+            <a:pPr lvl="1"/>
+            <a:r>
+              <a:rPr lang="en-US" sz="1400" dirty="0"/>
+              <a:t>FK – </a:t>
+            </a:r>
+            <a:r>
+              <a:rPr lang="en-US" sz="1400" dirty="0" err="1"/>
+              <a:t>principal_id</a:t>
+            </a:r>
+            <a:endParaRPr lang="en-US" sz="1400" dirty="0"/>
+          </a:p>
+          <a:p>
+            <a:pPr lvl="1"/>
+            <a:r>
+              <a:rPr lang="en-US" sz="1400" dirty="0"/>
+              <a:t>1:n relationship with Students</a:t>
+            </a:r>
+          </a:p>
+          <a:p>
+            <a:pPr lvl="1"/>
+            <a:r>
+              <a:rPr lang="en-US" sz="1400" dirty="0"/>
+              <a:t>1:1 relationship with principals</a:t>
+            </a:r>
+          </a:p>
+          <a:p>
+            <a:r>
+              <a:rPr lang="en-US" sz="1800" dirty="0"/>
+              <a:t>Principals</a:t>
+            </a:r>
+          </a:p>
+          <a:p>
+            <a:pPr lvl="1"/>
+            <a:r>
+              <a:rPr lang="en-US" sz="1400" dirty="0"/>
+              <a:t>PK – </a:t>
+            </a:r>
+            <a:r>
+              <a:rPr lang="en-US" sz="1400" dirty="0" err="1"/>
+              <a:t>principal_id</a:t>
+            </a:r>
+            <a:endParaRPr lang="en-US" sz="1400" dirty="0"/>
+          </a:p>
+          <a:p>
+            <a:pPr lvl="1"/>
+            <a:r>
+              <a:rPr lang="en-US" sz="1400" dirty="0"/>
+              <a:t>FK – </a:t>
+            </a:r>
+            <a:r>
+              <a:rPr lang="en-US" sz="1400" dirty="0" err="1"/>
+              <a:t>school_id</a:t>
+            </a:r>
+            <a:endParaRPr lang="en-US" sz="1400" dirty="0"/>
+          </a:p>
+          <a:p>
+            <a:pPr lvl="1"/>
+            <a:r>
+              <a:rPr lang="en-US" sz="1400" dirty="0"/>
+              <a:t>1:1 relationship with Schools</a:t>
+            </a:r>
+          </a:p>
+          <a:p>
+            <a:pPr lvl="1"/>
+            <a:endParaRPr lang="en-US" sz="1400" dirty="0"/>
+          </a:p>
+        </p:txBody>
+      </p:sp>
+    </p:spTree>
+    <p:extLst>
+      <p:ext uri="{BB962C8B-B14F-4D97-AF65-F5344CB8AC3E}">
+        <p14:creationId xmlns:p14="http://schemas.microsoft.com/office/powerpoint/2010/main" val="4130384251"/>
+      </p:ext>
+    </p:extLst>
+  </p:cSld>
+  <p:clrMapOvr>
+    <a:masterClrMapping/>
+  </p:clrMapOvr>
+</p:sld>
+</file>
+
 <file path=ppt/slides/slide2.xml><?xml version="1.0" encoding="utf-8"?>
 <p:sld xmlns:a="http://schemas.openxmlformats.org/drawingml/2006/main" xmlns:r="http://schemas.openxmlformats.org/officeDocument/2006/relationships" xmlns:p="http://schemas.openxmlformats.org/presentationml/2006/main">
   <p:cSld>
@@ -36937,6 +37997,2137 @@
           <p:cNvPr id="2" name="Title 1">
             <a:extLst>
               <a:ext uri="{FF2B5EF4-FFF2-40B4-BE49-F238E27FC236}">
+                <a16:creationId xmlns:a16="http://schemas.microsoft.com/office/drawing/2014/main" id="{437930B4-E996-4435-B9F1-D407853E2C03}"/>
+              </a:ext>
+            </a:extLst>
+          </p:cNvPr>
+          <p:cNvSpPr>
+            <a:spLocks noGrp="1"/>
+          </p:cNvSpPr>
+          <p:nvPr>
+            <p:ph type="title"/>
+          </p:nvPr>
+        </p:nvSpPr>
+        <p:spPr/>
+        <p:txBody>
+          <a:bodyPr/>
+          <a:lstStyle/>
+          <a:p>
+            <a:r>
+              <a:rPr lang="en-US" dirty="0"/>
+              <a:t>Database Structure</a:t>
+            </a:r>
+          </a:p>
+        </p:txBody>
+      </p:sp>
+      <p:sp>
+        <p:nvSpPr>
+          <p:cNvPr id="3" name="Text Placeholder 2">
+            <a:extLst>
+              <a:ext uri="{FF2B5EF4-FFF2-40B4-BE49-F238E27FC236}">
+                <a16:creationId xmlns:a16="http://schemas.microsoft.com/office/drawing/2014/main" id="{0C6BA468-B2FB-4410-8CC4-82872A4103B6}"/>
+              </a:ext>
+            </a:extLst>
+          </p:cNvPr>
+          <p:cNvSpPr>
+            <a:spLocks noGrp="1"/>
+          </p:cNvSpPr>
+          <p:nvPr>
+            <p:ph type="body" idx="1"/>
+          </p:nvPr>
+        </p:nvSpPr>
+        <p:spPr>
+          <a:xfrm>
+            <a:off x="380010" y="1481446"/>
+            <a:ext cx="8383980" cy="4882266"/>
+          </a:xfrm>
+        </p:spPr>
+        <p:txBody>
+          <a:bodyPr>
+            <a:normAutofit fontScale="92500" lnSpcReduction="20000"/>
+          </a:bodyPr>
+          <a:lstStyle/>
+          <a:p>
+            <a:r>
+              <a:rPr lang="en-US" dirty="0"/>
+              <a:t>PostgreSQL database clusters contain one or more databases. </a:t>
+            </a:r>
+          </a:p>
+          <a:p>
+            <a:pPr lvl="1"/>
+            <a:r>
+              <a:rPr lang="en-US" dirty="0"/>
+              <a:t>Users and groups of users are shared across the entire database</a:t>
+            </a:r>
+          </a:p>
+          <a:p>
+            <a:pPr lvl="1"/>
+            <a:r>
+              <a:rPr lang="en-US" dirty="0"/>
+              <a:t>No other data is shared across the databases.</a:t>
+            </a:r>
+          </a:p>
+          <a:p>
+            <a:r>
+              <a:rPr lang="en-US" b="1" dirty="0"/>
+              <a:t>Schemas</a:t>
+            </a:r>
+            <a:r>
+              <a:rPr lang="en-US" dirty="0"/>
+              <a:t> are named clusters of objects, functions and other data for a given database.</a:t>
+            </a:r>
+          </a:p>
+          <a:p>
+            <a:pPr lvl="1"/>
+            <a:r>
+              <a:rPr lang="en-US" dirty="0"/>
+              <a:t>Schemas are similar to ‘packages’ in java, and can be used to organize data within your database.</a:t>
+            </a:r>
+          </a:p>
+          <a:p>
+            <a:pPr lvl="1"/>
+            <a:r>
+              <a:rPr lang="en-US" dirty="0"/>
+              <a:t>The same object name can be used in different schemas without conflict.</a:t>
+            </a:r>
+          </a:p>
+          <a:p>
+            <a:pPr lvl="1"/>
+            <a:r>
+              <a:rPr lang="en-US" dirty="0"/>
+              <a:t>Use multiple schemas to allow many users to use one database without interfering with one another, or organize database objects into logical groups for maintainability.</a:t>
+            </a:r>
+          </a:p>
+        </p:txBody>
+      </p:sp>
+      <p:sp>
+        <p:nvSpPr>
+          <p:cNvPr id="4" name="Slide Number Placeholder 3">
+            <a:extLst>
+              <a:ext uri="{FF2B5EF4-FFF2-40B4-BE49-F238E27FC236}">
+                <a16:creationId xmlns:a16="http://schemas.microsoft.com/office/drawing/2014/main" id="{483A7CCD-D4F0-4527-9651-963B2389435E}"/>
+              </a:ext>
+            </a:extLst>
+          </p:cNvPr>
+          <p:cNvSpPr>
+            <a:spLocks noGrp="1"/>
+          </p:cNvSpPr>
+          <p:nvPr>
+            <p:ph type="sldNum" idx="12"/>
+          </p:nvPr>
+        </p:nvSpPr>
+        <p:spPr/>
+        <p:txBody>
+          <a:bodyPr/>
+          <a:lstStyle/>
+          <a:p>
+            <a:pPr marL="0" lvl="0" indent="0" algn="r" rtl="0">
+              <a:spcBef>
+                <a:spcPts val="0"/>
+              </a:spcBef>
+              <a:spcAft>
+                <a:spcPts val="0"/>
+              </a:spcAft>
+              <a:buNone/>
+            </a:pPr>
+            <a:fld id="{00000000-1234-1234-1234-123412341234}" type="slidenum">
+              <a:rPr lang="en-US" smtClean="0"/>
+              <a:t>2</a:t>
+            </a:fld>
+            <a:endParaRPr lang="en-US"/>
+          </a:p>
+        </p:txBody>
+      </p:sp>
+    </p:spTree>
+    <p:extLst>
+      <p:ext uri="{BB962C8B-B14F-4D97-AF65-F5344CB8AC3E}">
+        <p14:creationId xmlns:p14="http://schemas.microsoft.com/office/powerpoint/2010/main" val="1953690371"/>
+      </p:ext>
+    </p:extLst>
+  </p:cSld>
+  <p:clrMapOvr>
+    <a:masterClrMapping/>
+  </p:clrMapOvr>
+  <p:timing>
+    <p:tnLst>
+      <p:par>
+        <p:cTn id="1" dur="indefinite" restart="never" nodeType="tmRoot">
+          <p:childTnLst>
+            <p:seq concurrent="1" nextAc="seek">
+              <p:cTn id="2" dur="indefinite" nodeType="mainSeq">
+                <p:childTnLst>
+                  <p:par>
+                    <p:cTn id="3" fill="hold">
+                      <p:stCondLst>
+                        <p:cond delay="indefinite"/>
+                      </p:stCondLst>
+                      <p:childTnLst>
+                        <p:par>
+                          <p:cTn id="4" fill="hold">
+                            <p:stCondLst>
+                              <p:cond delay="0"/>
+                            </p:stCondLst>
+                            <p:childTnLst>
+                              <p:par>
+                                <p:cTn id="5" presetID="1" presetClass="entr" presetSubtype="0" fill="hold" grpId="0" nodeType="clickEffect">
+                                  <p:stCondLst>
+                                    <p:cond delay="0"/>
+                                  </p:stCondLst>
+                                  <p:childTnLst>
+                                    <p:set>
+                                      <p:cBhvr>
+                                        <p:cTn id="6" dur="1" fill="hold">
+                                          <p:stCondLst>
+                                            <p:cond delay="0"/>
+                                          </p:stCondLst>
+                                        </p:cTn>
+                                        <p:tgtEl>
+                                          <p:spTgt spid="3">
+                                            <p:txEl>
+                                              <p:pRg st="0" end="0"/>
+                                            </p:txEl>
+                                          </p:spTgt>
+                                        </p:tgtEl>
+                                        <p:attrNameLst>
+                                          <p:attrName>style.visibility</p:attrName>
+                                        </p:attrNameLst>
+                                      </p:cBhvr>
+                                      <p:to>
+                                        <p:strVal val="visible"/>
+                                      </p:to>
+                                    </p:set>
+                                  </p:childTnLst>
+                                </p:cTn>
+                              </p:par>
+                              <p:par>
+                                <p:cTn id="7" presetID="1" presetClass="entr" presetSubtype="0" fill="hold" grpId="0" nodeType="withEffect">
+                                  <p:stCondLst>
+                                    <p:cond delay="0"/>
+                                  </p:stCondLst>
+                                  <p:childTnLst>
+                                    <p:set>
+                                      <p:cBhvr>
+                                        <p:cTn id="8" dur="1" fill="hold">
+                                          <p:stCondLst>
+                                            <p:cond delay="0"/>
+                                          </p:stCondLst>
+                                        </p:cTn>
+                                        <p:tgtEl>
+                                          <p:spTgt spid="3">
+                                            <p:txEl>
+                                              <p:pRg st="1" end="1"/>
+                                            </p:txEl>
+                                          </p:spTgt>
+                                        </p:tgtEl>
+                                        <p:attrNameLst>
+                                          <p:attrName>style.visibility</p:attrName>
+                                        </p:attrNameLst>
+                                      </p:cBhvr>
+                                      <p:to>
+                                        <p:strVal val="visible"/>
+                                      </p:to>
+                                    </p:set>
+                                  </p:childTnLst>
+                                </p:cTn>
+                              </p:par>
+                              <p:par>
+                                <p:cTn id="9" presetID="1" presetClass="entr" presetSubtype="0" fill="hold" grpId="0" nodeType="withEffect">
+                                  <p:stCondLst>
+                                    <p:cond delay="0"/>
+                                  </p:stCondLst>
+                                  <p:childTnLst>
+                                    <p:set>
+                                      <p:cBhvr>
+                                        <p:cTn id="10" dur="1" fill="hold">
+                                          <p:stCondLst>
+                                            <p:cond delay="0"/>
+                                          </p:stCondLst>
+                                        </p:cTn>
+                                        <p:tgtEl>
+                                          <p:spTgt spid="3">
+                                            <p:txEl>
+                                              <p:pRg st="2" end="2"/>
+                                            </p:txEl>
+                                          </p:spTgt>
+                                        </p:tgtEl>
+                                        <p:attrNameLst>
+                                          <p:attrName>style.visibility</p:attrName>
+                                        </p:attrNameLst>
+                                      </p:cBhvr>
+                                      <p:to>
+                                        <p:strVal val="visible"/>
+                                      </p:to>
+                                    </p:set>
+                                  </p:childTnLst>
+                                </p:cTn>
+                              </p:par>
+                            </p:childTnLst>
+                          </p:cTn>
+                        </p:par>
+                      </p:childTnLst>
+                    </p:cTn>
+                  </p:par>
+                  <p:par>
+                    <p:cTn id="11" fill="hold">
+                      <p:stCondLst>
+                        <p:cond delay="indefinite"/>
+                      </p:stCondLst>
+                      <p:childTnLst>
+                        <p:par>
+                          <p:cTn id="12" fill="hold">
+                            <p:stCondLst>
+                              <p:cond delay="0"/>
+                            </p:stCondLst>
+                            <p:childTnLst>
+                              <p:par>
+                                <p:cTn id="13" presetID="1" presetClass="entr" presetSubtype="0" fill="hold" grpId="0" nodeType="clickEffect">
+                                  <p:stCondLst>
+                                    <p:cond delay="0"/>
+                                  </p:stCondLst>
+                                  <p:childTnLst>
+                                    <p:set>
+                                      <p:cBhvr>
+                                        <p:cTn id="14" dur="1" fill="hold">
+                                          <p:stCondLst>
+                                            <p:cond delay="0"/>
+                                          </p:stCondLst>
+                                        </p:cTn>
+                                        <p:tgtEl>
+                                          <p:spTgt spid="3">
+                                            <p:txEl>
+                                              <p:pRg st="3" end="3"/>
+                                            </p:txEl>
+                                          </p:spTgt>
+                                        </p:tgtEl>
+                                        <p:attrNameLst>
+                                          <p:attrName>style.visibility</p:attrName>
+                                        </p:attrNameLst>
+                                      </p:cBhvr>
+                                      <p:to>
+                                        <p:strVal val="visible"/>
+                                      </p:to>
+                                    </p:set>
+                                  </p:childTnLst>
+                                </p:cTn>
+                              </p:par>
+                              <p:par>
+                                <p:cTn id="15" presetID="1" presetClass="entr" presetSubtype="0" fill="hold" grpId="0" nodeType="withEffect">
+                                  <p:stCondLst>
+                                    <p:cond delay="0"/>
+                                  </p:stCondLst>
+                                  <p:childTnLst>
+                                    <p:set>
+                                      <p:cBhvr>
+                                        <p:cTn id="16" dur="1" fill="hold">
+                                          <p:stCondLst>
+                                            <p:cond delay="0"/>
+                                          </p:stCondLst>
+                                        </p:cTn>
+                                        <p:tgtEl>
+                                          <p:spTgt spid="3">
+                                            <p:txEl>
+                                              <p:pRg st="4" end="4"/>
+                                            </p:txEl>
+                                          </p:spTgt>
+                                        </p:tgtEl>
+                                        <p:attrNameLst>
+                                          <p:attrName>style.visibility</p:attrName>
+                                        </p:attrNameLst>
+                                      </p:cBhvr>
+                                      <p:to>
+                                        <p:strVal val="visible"/>
+                                      </p:to>
+                                    </p:set>
+                                  </p:childTnLst>
+                                </p:cTn>
+                              </p:par>
+                              <p:par>
+                                <p:cTn id="17" presetID="1" presetClass="entr" presetSubtype="0" fill="hold" grpId="0" nodeType="withEffect">
+                                  <p:stCondLst>
+                                    <p:cond delay="0"/>
+                                  </p:stCondLst>
+                                  <p:childTnLst>
+                                    <p:set>
+                                      <p:cBhvr>
+                                        <p:cTn id="18" dur="1" fill="hold">
+                                          <p:stCondLst>
+                                            <p:cond delay="0"/>
+                                          </p:stCondLst>
+                                        </p:cTn>
+                                        <p:tgtEl>
+                                          <p:spTgt spid="3">
+                                            <p:txEl>
+                                              <p:pRg st="5" end="5"/>
+                                            </p:txEl>
+                                          </p:spTgt>
+                                        </p:tgtEl>
+                                        <p:attrNameLst>
+                                          <p:attrName>style.visibility</p:attrName>
+                                        </p:attrNameLst>
+                                      </p:cBhvr>
+                                      <p:to>
+                                        <p:strVal val="visible"/>
+                                      </p:to>
+                                    </p:set>
+                                  </p:childTnLst>
+                                </p:cTn>
+                              </p:par>
+                              <p:par>
+                                <p:cTn id="19" presetID="1" presetClass="entr" presetSubtype="0" fill="hold" grpId="0" nodeType="withEffect">
+                                  <p:stCondLst>
+                                    <p:cond delay="0"/>
+                                  </p:stCondLst>
+                                  <p:childTnLst>
+                                    <p:set>
+                                      <p:cBhvr>
+                                        <p:cTn id="20" dur="1" fill="hold">
+                                          <p:stCondLst>
+                                            <p:cond delay="0"/>
+                                          </p:stCondLst>
+                                        </p:cTn>
+                                        <p:tgtEl>
+                                          <p:spTgt spid="3">
+                                            <p:txEl>
+                                              <p:pRg st="6" end="6"/>
+                                            </p:txEl>
+                                          </p:spTgt>
+                                        </p:tgtEl>
+                                        <p:attrNameLst>
+                                          <p:attrName>style.visibility</p:attrName>
+                                        </p:attrNameLst>
+                                      </p:cBhvr>
+                                      <p:to>
+                                        <p:strVal val="visible"/>
+                                      </p:to>
+                                    </p:set>
+                                  </p:childTnLst>
+                                </p:cTn>
+                              </p:par>
+                            </p:childTnLst>
+                          </p:cTn>
+                        </p:par>
+                      </p:childTnLst>
+                    </p:cTn>
+                  </p:par>
+                </p:childTnLst>
+              </p:cTn>
+              <p:prevCondLst>
+                <p:cond evt="onPrev" delay="0">
+                  <p:tgtEl>
+                    <p:sldTgt/>
+                  </p:tgtEl>
+                </p:cond>
+              </p:prevCondLst>
+              <p:nextCondLst>
+                <p:cond evt="onNext" delay="0">
+                  <p:tgtEl>
+                    <p:sldTgt/>
+                  </p:tgtEl>
+                </p:cond>
+              </p:nextCondLst>
+            </p:seq>
+          </p:childTnLst>
+        </p:cTn>
+      </p:par>
+    </p:tnLst>
+    <p:bldLst>
+      <p:bldP spid="3" grpId="0" build="p"/>
+    </p:bldLst>
+  </p:timing>
+</p:sld>
+</file>
+
+<file path=ppt/slides/slide4.xml><?xml version="1.0" encoding="utf-8"?>
+<p:sld xmlns:a="http://schemas.openxmlformats.org/drawingml/2006/main" xmlns:r="http://schemas.openxmlformats.org/officeDocument/2006/relationships" xmlns:p="http://schemas.openxmlformats.org/presentationml/2006/main">
+  <p:cSld>
+    <p:spTree>
+      <p:nvGrpSpPr>
+        <p:cNvPr id="1" name=""/>
+        <p:cNvGrpSpPr/>
+        <p:nvPr/>
+      </p:nvGrpSpPr>
+      <p:grpSpPr>
+        <a:xfrm>
+          <a:off x="0" y="0"/>
+          <a:ext cx="0" cy="0"/>
+          <a:chOff x="0" y="0"/>
+          <a:chExt cx="0" cy="0"/>
+        </a:xfrm>
+      </p:grpSpPr>
+      <p:sp>
+        <p:nvSpPr>
+          <p:cNvPr id="2" name="Title 1">
+            <a:extLst>
+              <a:ext uri="{FF2B5EF4-FFF2-40B4-BE49-F238E27FC236}">
+                <a16:creationId xmlns:a16="http://schemas.microsoft.com/office/drawing/2014/main" id="{437930B4-E996-4435-B9F1-D407853E2C03}"/>
+              </a:ext>
+            </a:extLst>
+          </p:cNvPr>
+          <p:cNvSpPr>
+            <a:spLocks noGrp="1"/>
+          </p:cNvSpPr>
+          <p:nvPr>
+            <p:ph type="title"/>
+          </p:nvPr>
+        </p:nvSpPr>
+        <p:spPr/>
+        <p:txBody>
+          <a:bodyPr/>
+          <a:lstStyle/>
+          <a:p>
+            <a:r>
+              <a:rPr lang="en-US" dirty="0"/>
+              <a:t>More on Schemas</a:t>
+            </a:r>
+          </a:p>
+        </p:txBody>
+      </p:sp>
+      <p:sp>
+        <p:nvSpPr>
+          <p:cNvPr id="3" name="Text Placeholder 2">
+            <a:extLst>
+              <a:ext uri="{FF2B5EF4-FFF2-40B4-BE49-F238E27FC236}">
+                <a16:creationId xmlns:a16="http://schemas.microsoft.com/office/drawing/2014/main" id="{0C6BA468-B2FB-4410-8CC4-82872A4103B6}"/>
+              </a:ext>
+            </a:extLst>
+          </p:cNvPr>
+          <p:cNvSpPr>
+            <a:spLocks noGrp="1"/>
+          </p:cNvSpPr>
+          <p:nvPr>
+            <p:ph type="body" idx="1"/>
+          </p:nvPr>
+        </p:nvSpPr>
+        <p:spPr>
+          <a:xfrm>
+            <a:off x="380010" y="1481446"/>
+            <a:ext cx="8383980" cy="4882266"/>
+          </a:xfrm>
+        </p:spPr>
+        <p:txBody>
+          <a:bodyPr>
+            <a:normAutofit/>
+          </a:bodyPr>
+          <a:lstStyle/>
+          <a:p>
+            <a:r>
+              <a:rPr lang="en-US" dirty="0"/>
+              <a:t>You can use the CREATE command to declare a new Schema:</a:t>
+            </a:r>
+          </a:p>
+          <a:p>
+            <a:endParaRPr lang="en-US" dirty="0"/>
+          </a:p>
+          <a:p>
+            <a:endParaRPr lang="en-US" dirty="0"/>
+          </a:p>
+          <a:p>
+            <a:r>
+              <a:rPr lang="en-US" dirty="0"/>
+              <a:t>To access an object in a schema, you can use the schemas as the ‘</a:t>
+            </a:r>
+            <a:r>
+              <a:rPr lang="en-US" i="1" dirty="0"/>
+              <a:t>qualified name’.</a:t>
+            </a:r>
+          </a:p>
+          <a:p>
+            <a:endParaRPr lang="en-US" i="1" dirty="0"/>
+          </a:p>
+          <a:p>
+            <a:endParaRPr lang="en-US" i="1" dirty="0"/>
+          </a:p>
+          <a:p>
+            <a:r>
+              <a:rPr lang="en-US" dirty="0"/>
+              <a:t>To remove a Schema, use the DROP command</a:t>
+            </a:r>
+          </a:p>
+        </p:txBody>
+      </p:sp>
+      <p:sp>
+        <p:nvSpPr>
+          <p:cNvPr id="4" name="Slide Number Placeholder 3">
+            <a:extLst>
+              <a:ext uri="{FF2B5EF4-FFF2-40B4-BE49-F238E27FC236}">
+                <a16:creationId xmlns:a16="http://schemas.microsoft.com/office/drawing/2014/main" id="{483A7CCD-D4F0-4527-9651-963B2389435E}"/>
+              </a:ext>
+            </a:extLst>
+          </p:cNvPr>
+          <p:cNvSpPr>
+            <a:spLocks noGrp="1"/>
+          </p:cNvSpPr>
+          <p:nvPr>
+            <p:ph type="sldNum" idx="12"/>
+          </p:nvPr>
+        </p:nvSpPr>
+        <p:spPr/>
+        <p:txBody>
+          <a:bodyPr/>
+          <a:lstStyle/>
+          <a:p>
+            <a:pPr marL="0" lvl="0" indent="0" algn="r" rtl="0">
+              <a:spcBef>
+                <a:spcPts val="0"/>
+              </a:spcBef>
+              <a:spcAft>
+                <a:spcPts val="0"/>
+              </a:spcAft>
+              <a:buNone/>
+            </a:pPr>
+            <a:fld id="{00000000-1234-1234-1234-123412341234}" type="slidenum">
+              <a:rPr lang="en-US" smtClean="0"/>
+              <a:t>3</a:t>
+            </a:fld>
+            <a:endParaRPr lang="en-US"/>
+          </a:p>
+        </p:txBody>
+      </p:sp>
+      <p:sp>
+        <p:nvSpPr>
+          <p:cNvPr id="5" name="Google Shape;219;p16">
+            <a:extLst>
+              <a:ext uri="{FF2B5EF4-FFF2-40B4-BE49-F238E27FC236}">
+                <a16:creationId xmlns:a16="http://schemas.microsoft.com/office/drawing/2014/main" id="{F22B2846-D68D-4E2A-B387-AF1CEC22F710}"/>
+              </a:ext>
+            </a:extLst>
+          </p:cNvPr>
+          <p:cNvSpPr txBox="1">
+            <a:spLocks/>
+          </p:cNvSpPr>
+          <p:nvPr/>
+        </p:nvSpPr>
+        <p:spPr>
+          <a:xfrm>
+            <a:off x="2392017" y="2729949"/>
+            <a:ext cx="4359965" cy="490329"/>
+          </a:xfrm>
+          <a:prstGeom prst="rect">
+            <a:avLst/>
+          </a:prstGeom>
+        </p:spPr>
+        <p:style>
+          <a:lnRef idx="1">
+            <a:schemeClr val="accent2"/>
+          </a:lnRef>
+          <a:fillRef idx="2">
+            <a:schemeClr val="accent2"/>
+          </a:fillRef>
+          <a:effectRef idx="1">
+            <a:schemeClr val="accent2"/>
+          </a:effectRef>
+          <a:fontRef idx="minor">
+            <a:schemeClr val="dk1"/>
+          </a:fontRef>
+        </p:style>
+        <p:txBody>
+          <a:bodyPr spcFirstLastPara="1" wrap="square" lIns="91425" tIns="45700" rIns="91425" bIns="45700" anchor="t" anchorCtr="0">
+            <a:normAutofit fontScale="92500"/>
+          </a:bodyPr>
+          <a:lstStyle>
+            <a:defPPr marR="0" lvl="0" algn="l" rtl="0">
+              <a:lnSpc>
+                <a:spcPct val="100000"/>
+              </a:lnSpc>
+              <a:spcBef>
+                <a:spcPts val="0"/>
+              </a:spcBef>
+              <a:spcAft>
+                <a:spcPts val="0"/>
+              </a:spcAft>
+            </a:defPPr>
+            <a:lvl1pPr marL="457200" marR="0" lvl="0" indent="-406400" algn="l" rtl="0">
+              <a:lnSpc>
+                <a:spcPct val="100000"/>
+              </a:lnSpc>
+              <a:spcBef>
+                <a:spcPts val="560"/>
+              </a:spcBef>
+              <a:spcAft>
+                <a:spcPts val="0"/>
+              </a:spcAft>
+              <a:buClr>
+                <a:schemeClr val="accent1"/>
+              </a:buClr>
+              <a:buSzPts val="2800"/>
+              <a:buFont typeface="Arial"/>
+              <a:buChar char="•"/>
+              <a:defRPr sz="2800" b="0" i="0" u="none" strike="noStrike" cap="none">
+                <a:solidFill>
+                  <a:schemeClr val="dk2"/>
+                </a:solidFill>
+                <a:latin typeface="Arial"/>
+                <a:ea typeface="Arial"/>
+                <a:cs typeface="Arial"/>
+                <a:sym typeface="Arial"/>
+              </a:defRPr>
+            </a:lvl1pPr>
+            <a:lvl2pPr marL="914400" marR="0" lvl="1" indent="-381000" algn="l" rtl="0">
+              <a:lnSpc>
+                <a:spcPct val="100000"/>
+              </a:lnSpc>
+              <a:spcBef>
+                <a:spcPts val="480"/>
+              </a:spcBef>
+              <a:spcAft>
+                <a:spcPts val="0"/>
+              </a:spcAft>
+              <a:buClr>
+                <a:schemeClr val="accent1"/>
+              </a:buClr>
+              <a:buSzPts val="2400"/>
+              <a:buFont typeface="Arial"/>
+              <a:buChar char="–"/>
+              <a:defRPr sz="2400" b="0" i="0" u="none" strike="noStrike" cap="none">
+                <a:solidFill>
+                  <a:schemeClr val="dk2"/>
+                </a:solidFill>
+                <a:latin typeface="Arial"/>
+                <a:ea typeface="Arial"/>
+                <a:cs typeface="Arial"/>
+                <a:sym typeface="Arial"/>
+              </a:defRPr>
+            </a:lvl2pPr>
+            <a:lvl3pPr marL="1371600" marR="0" lvl="2" indent="-355600" algn="l" rtl="0">
+              <a:lnSpc>
+                <a:spcPct val="100000"/>
+              </a:lnSpc>
+              <a:spcBef>
+                <a:spcPts val="400"/>
+              </a:spcBef>
+              <a:spcAft>
+                <a:spcPts val="0"/>
+              </a:spcAft>
+              <a:buClr>
+                <a:schemeClr val="accent1"/>
+              </a:buClr>
+              <a:buSzPts val="2000"/>
+              <a:buFont typeface="Arial"/>
+              <a:buChar char="•"/>
+              <a:defRPr sz="2000" b="0" i="0" u="none" strike="noStrike" cap="none">
+                <a:solidFill>
+                  <a:schemeClr val="dk2"/>
+                </a:solidFill>
+                <a:latin typeface="Arial"/>
+                <a:ea typeface="Arial"/>
+                <a:cs typeface="Arial"/>
+                <a:sym typeface="Arial"/>
+              </a:defRPr>
+            </a:lvl3pPr>
+            <a:lvl4pPr marL="1828800" marR="0" lvl="3" indent="-342900" algn="l" rtl="0">
+              <a:lnSpc>
+                <a:spcPct val="100000"/>
+              </a:lnSpc>
+              <a:spcBef>
+                <a:spcPts val="360"/>
+              </a:spcBef>
+              <a:spcAft>
+                <a:spcPts val="0"/>
+              </a:spcAft>
+              <a:buClr>
+                <a:schemeClr val="accent1"/>
+              </a:buClr>
+              <a:buSzPts val="1800"/>
+              <a:buFont typeface="Arial"/>
+              <a:buChar char="–"/>
+              <a:defRPr sz="1800" b="0" i="0" u="none" strike="noStrike" cap="none">
+                <a:solidFill>
+                  <a:schemeClr val="dk2"/>
+                </a:solidFill>
+                <a:latin typeface="Arial"/>
+                <a:ea typeface="Arial"/>
+                <a:cs typeface="Arial"/>
+                <a:sym typeface="Arial"/>
+              </a:defRPr>
+            </a:lvl4pPr>
+            <a:lvl5pPr marL="2286000" marR="0" lvl="4" indent="-342900" algn="l" rtl="0">
+              <a:lnSpc>
+                <a:spcPct val="100000"/>
+              </a:lnSpc>
+              <a:spcBef>
+                <a:spcPts val="360"/>
+              </a:spcBef>
+              <a:spcAft>
+                <a:spcPts val="0"/>
+              </a:spcAft>
+              <a:buClr>
+                <a:schemeClr val="accent1"/>
+              </a:buClr>
+              <a:buSzPts val="1800"/>
+              <a:buFont typeface="Arial"/>
+              <a:buChar char="»"/>
+              <a:defRPr sz="1800" b="0" i="0" u="none" strike="noStrike" cap="none">
+                <a:solidFill>
+                  <a:schemeClr val="dk2"/>
+                </a:solidFill>
+                <a:latin typeface="Arial"/>
+                <a:ea typeface="Arial"/>
+                <a:cs typeface="Arial"/>
+                <a:sym typeface="Arial"/>
+              </a:defRPr>
+            </a:lvl5pPr>
+            <a:lvl6pPr marL="2743200" marR="0" lvl="5" indent="-342900" algn="l" rtl="0">
+              <a:lnSpc>
+                <a:spcPct val="100000"/>
+              </a:lnSpc>
+              <a:spcBef>
+                <a:spcPts val="360"/>
+              </a:spcBef>
+              <a:spcAft>
+                <a:spcPts val="0"/>
+              </a:spcAft>
+              <a:buClr>
+                <a:schemeClr val="dk1"/>
+              </a:buClr>
+              <a:buSzPts val="1800"/>
+              <a:buFont typeface="Arial"/>
+              <a:buChar char="•"/>
+              <a:defRPr sz="2000" b="0" i="0" u="none" strike="noStrike" cap="none">
+                <a:solidFill>
+                  <a:schemeClr val="dk1"/>
+                </a:solidFill>
+                <a:latin typeface="Arial"/>
+                <a:ea typeface="Arial"/>
+                <a:cs typeface="Arial"/>
+                <a:sym typeface="Arial"/>
+              </a:defRPr>
+            </a:lvl6pPr>
+            <a:lvl7pPr marL="3200400" marR="0" lvl="6" indent="-342900" algn="l" rtl="0">
+              <a:lnSpc>
+                <a:spcPct val="100000"/>
+              </a:lnSpc>
+              <a:spcBef>
+                <a:spcPts val="360"/>
+              </a:spcBef>
+              <a:spcAft>
+                <a:spcPts val="0"/>
+              </a:spcAft>
+              <a:buClr>
+                <a:schemeClr val="dk1"/>
+              </a:buClr>
+              <a:buSzPts val="1800"/>
+              <a:buFont typeface="Arial"/>
+              <a:buChar char="•"/>
+              <a:defRPr sz="2000" b="0" i="0" u="none" strike="noStrike" cap="none">
+                <a:solidFill>
+                  <a:schemeClr val="dk1"/>
+                </a:solidFill>
+                <a:latin typeface="Arial"/>
+                <a:ea typeface="Arial"/>
+                <a:cs typeface="Arial"/>
+                <a:sym typeface="Arial"/>
+              </a:defRPr>
+            </a:lvl7pPr>
+            <a:lvl8pPr marL="3657600" marR="0" lvl="7" indent="-342900" algn="l" rtl="0">
+              <a:lnSpc>
+                <a:spcPct val="100000"/>
+              </a:lnSpc>
+              <a:spcBef>
+                <a:spcPts val="360"/>
+              </a:spcBef>
+              <a:spcAft>
+                <a:spcPts val="0"/>
+              </a:spcAft>
+              <a:buClr>
+                <a:schemeClr val="dk1"/>
+              </a:buClr>
+              <a:buSzPts val="1800"/>
+              <a:buFont typeface="Arial"/>
+              <a:buChar char="•"/>
+              <a:defRPr sz="2000" b="0" i="0" u="none" strike="noStrike" cap="none">
+                <a:solidFill>
+                  <a:schemeClr val="dk1"/>
+                </a:solidFill>
+                <a:latin typeface="Arial"/>
+                <a:ea typeface="Arial"/>
+                <a:cs typeface="Arial"/>
+                <a:sym typeface="Arial"/>
+              </a:defRPr>
+            </a:lvl8pPr>
+            <a:lvl9pPr marL="4114800" marR="0" lvl="8" indent="-342900" algn="l" rtl="0">
+              <a:lnSpc>
+                <a:spcPct val="100000"/>
+              </a:lnSpc>
+              <a:spcBef>
+                <a:spcPts val="360"/>
+              </a:spcBef>
+              <a:spcAft>
+                <a:spcPts val="0"/>
+              </a:spcAft>
+              <a:buClr>
+                <a:schemeClr val="dk1"/>
+              </a:buClr>
+              <a:buSzPts val="1800"/>
+              <a:buFont typeface="Arial"/>
+              <a:buChar char="•"/>
+              <a:defRPr sz="2000" b="0" i="0" u="none" strike="noStrike" cap="none">
+                <a:solidFill>
+                  <a:schemeClr val="dk1"/>
+                </a:solidFill>
+                <a:latin typeface="Arial"/>
+                <a:ea typeface="Arial"/>
+                <a:cs typeface="Arial"/>
+                <a:sym typeface="Arial"/>
+              </a:defRPr>
+            </a:lvl9pPr>
+          </a:lstStyle>
+          <a:p>
+            <a:pPr marL="182880" lvl="1" indent="0" defTabSz="457200">
+              <a:lnSpc>
+                <a:spcPct val="90000"/>
+              </a:lnSpc>
+              <a:buFont typeface="Arial"/>
+              <a:buNone/>
+            </a:pPr>
+            <a:r>
+              <a:rPr lang="en-US" b="1" dirty="0">
+                <a:latin typeface="Courier New" panose="02070309020205020404" pitchFamily="49" charset="0"/>
+                <a:cs typeface="Courier New" panose="02070309020205020404" pitchFamily="49" charset="0"/>
+              </a:rPr>
+              <a:t>CREATE SCHEMA</a:t>
+            </a:r>
+            <a:r>
+              <a:rPr lang="en-US" dirty="0">
+                <a:latin typeface="Courier New" panose="02070309020205020404" pitchFamily="49" charset="0"/>
+                <a:cs typeface="Courier New" panose="02070309020205020404" pitchFamily="49" charset="0"/>
+              </a:rPr>
+              <a:t> </a:t>
+            </a:r>
+            <a:r>
+              <a:rPr lang="en-US" dirty="0" err="1">
+                <a:latin typeface="Courier New" panose="02070309020205020404" pitchFamily="49" charset="0"/>
+                <a:cs typeface="Courier New" panose="02070309020205020404" pitchFamily="49" charset="0"/>
+              </a:rPr>
+              <a:t>mySchema</a:t>
+            </a:r>
+            <a:r>
+              <a:rPr lang="en-US" dirty="0">
+                <a:latin typeface="Courier New" panose="02070309020205020404" pitchFamily="49" charset="0"/>
+                <a:cs typeface="Courier New" panose="02070309020205020404" pitchFamily="49" charset="0"/>
+              </a:rPr>
+              <a:t>;</a:t>
+            </a:r>
+          </a:p>
+          <a:p>
+            <a:pPr marL="182880" lvl="1" indent="0" defTabSz="457200">
+              <a:lnSpc>
+                <a:spcPct val="90000"/>
+              </a:lnSpc>
+              <a:buFont typeface="Arial"/>
+              <a:buNone/>
+            </a:pPr>
+            <a:endParaRPr lang="en-US" sz="1400" dirty="0">
+              <a:latin typeface="Courier New" panose="02070309020205020404" pitchFamily="49" charset="0"/>
+              <a:cs typeface="Courier New" panose="02070309020205020404" pitchFamily="49" charset="0"/>
+            </a:endParaRPr>
+          </a:p>
+        </p:txBody>
+      </p:sp>
+      <p:sp>
+        <p:nvSpPr>
+          <p:cNvPr id="6" name="Google Shape;219;p16">
+            <a:extLst>
+              <a:ext uri="{FF2B5EF4-FFF2-40B4-BE49-F238E27FC236}">
+                <a16:creationId xmlns:a16="http://schemas.microsoft.com/office/drawing/2014/main" id="{F751754F-2D46-462E-AB22-ACB4975F20F7}"/>
+              </a:ext>
+            </a:extLst>
+          </p:cNvPr>
+          <p:cNvSpPr txBox="1">
+            <a:spLocks/>
+          </p:cNvSpPr>
+          <p:nvPr/>
+        </p:nvSpPr>
+        <p:spPr>
+          <a:xfrm>
+            <a:off x="981073" y="4652847"/>
+            <a:ext cx="7181852" cy="490329"/>
+          </a:xfrm>
+          <a:prstGeom prst="rect">
+            <a:avLst/>
+          </a:prstGeom>
+        </p:spPr>
+        <p:style>
+          <a:lnRef idx="1">
+            <a:schemeClr val="accent2"/>
+          </a:lnRef>
+          <a:fillRef idx="2">
+            <a:schemeClr val="accent2"/>
+          </a:fillRef>
+          <a:effectRef idx="1">
+            <a:schemeClr val="accent2"/>
+          </a:effectRef>
+          <a:fontRef idx="minor">
+            <a:schemeClr val="dk1"/>
+          </a:fontRef>
+        </p:style>
+        <p:txBody>
+          <a:bodyPr spcFirstLastPara="1" wrap="square" lIns="91425" tIns="45700" rIns="91425" bIns="45700" anchor="t" anchorCtr="0">
+            <a:normAutofit/>
+          </a:bodyPr>
+          <a:lstStyle>
+            <a:defPPr marR="0" lvl="0" algn="l" rtl="0">
+              <a:lnSpc>
+                <a:spcPct val="100000"/>
+              </a:lnSpc>
+              <a:spcBef>
+                <a:spcPts val="0"/>
+              </a:spcBef>
+              <a:spcAft>
+                <a:spcPts val="0"/>
+              </a:spcAft>
+            </a:defPPr>
+            <a:lvl1pPr marL="457200" marR="0" lvl="0" indent="-406400" algn="l" rtl="0">
+              <a:lnSpc>
+                <a:spcPct val="100000"/>
+              </a:lnSpc>
+              <a:spcBef>
+                <a:spcPts val="560"/>
+              </a:spcBef>
+              <a:spcAft>
+                <a:spcPts val="0"/>
+              </a:spcAft>
+              <a:buClr>
+                <a:schemeClr val="accent1"/>
+              </a:buClr>
+              <a:buSzPts val="2800"/>
+              <a:buFont typeface="Arial"/>
+              <a:buChar char="•"/>
+              <a:defRPr sz="2800" b="0" i="0" u="none" strike="noStrike" cap="none">
+                <a:solidFill>
+                  <a:schemeClr val="dk2"/>
+                </a:solidFill>
+                <a:latin typeface="Arial"/>
+                <a:ea typeface="Arial"/>
+                <a:cs typeface="Arial"/>
+                <a:sym typeface="Arial"/>
+              </a:defRPr>
+            </a:lvl1pPr>
+            <a:lvl2pPr marL="914400" marR="0" lvl="1" indent="-381000" algn="l" rtl="0">
+              <a:lnSpc>
+                <a:spcPct val="100000"/>
+              </a:lnSpc>
+              <a:spcBef>
+                <a:spcPts val="480"/>
+              </a:spcBef>
+              <a:spcAft>
+                <a:spcPts val="0"/>
+              </a:spcAft>
+              <a:buClr>
+                <a:schemeClr val="accent1"/>
+              </a:buClr>
+              <a:buSzPts val="2400"/>
+              <a:buFont typeface="Arial"/>
+              <a:buChar char="–"/>
+              <a:defRPr sz="2400" b="0" i="0" u="none" strike="noStrike" cap="none">
+                <a:solidFill>
+                  <a:schemeClr val="dk2"/>
+                </a:solidFill>
+                <a:latin typeface="Arial"/>
+                <a:ea typeface="Arial"/>
+                <a:cs typeface="Arial"/>
+                <a:sym typeface="Arial"/>
+              </a:defRPr>
+            </a:lvl2pPr>
+            <a:lvl3pPr marL="1371600" marR="0" lvl="2" indent="-355600" algn="l" rtl="0">
+              <a:lnSpc>
+                <a:spcPct val="100000"/>
+              </a:lnSpc>
+              <a:spcBef>
+                <a:spcPts val="400"/>
+              </a:spcBef>
+              <a:spcAft>
+                <a:spcPts val="0"/>
+              </a:spcAft>
+              <a:buClr>
+                <a:schemeClr val="accent1"/>
+              </a:buClr>
+              <a:buSzPts val="2000"/>
+              <a:buFont typeface="Arial"/>
+              <a:buChar char="•"/>
+              <a:defRPr sz="2000" b="0" i="0" u="none" strike="noStrike" cap="none">
+                <a:solidFill>
+                  <a:schemeClr val="dk2"/>
+                </a:solidFill>
+                <a:latin typeface="Arial"/>
+                <a:ea typeface="Arial"/>
+                <a:cs typeface="Arial"/>
+                <a:sym typeface="Arial"/>
+              </a:defRPr>
+            </a:lvl3pPr>
+            <a:lvl4pPr marL="1828800" marR="0" lvl="3" indent="-342900" algn="l" rtl="0">
+              <a:lnSpc>
+                <a:spcPct val="100000"/>
+              </a:lnSpc>
+              <a:spcBef>
+                <a:spcPts val="360"/>
+              </a:spcBef>
+              <a:spcAft>
+                <a:spcPts val="0"/>
+              </a:spcAft>
+              <a:buClr>
+                <a:schemeClr val="accent1"/>
+              </a:buClr>
+              <a:buSzPts val="1800"/>
+              <a:buFont typeface="Arial"/>
+              <a:buChar char="–"/>
+              <a:defRPr sz="1800" b="0" i="0" u="none" strike="noStrike" cap="none">
+                <a:solidFill>
+                  <a:schemeClr val="dk2"/>
+                </a:solidFill>
+                <a:latin typeface="Arial"/>
+                <a:ea typeface="Arial"/>
+                <a:cs typeface="Arial"/>
+                <a:sym typeface="Arial"/>
+              </a:defRPr>
+            </a:lvl4pPr>
+            <a:lvl5pPr marL="2286000" marR="0" lvl="4" indent="-342900" algn="l" rtl="0">
+              <a:lnSpc>
+                <a:spcPct val="100000"/>
+              </a:lnSpc>
+              <a:spcBef>
+                <a:spcPts val="360"/>
+              </a:spcBef>
+              <a:spcAft>
+                <a:spcPts val="0"/>
+              </a:spcAft>
+              <a:buClr>
+                <a:schemeClr val="accent1"/>
+              </a:buClr>
+              <a:buSzPts val="1800"/>
+              <a:buFont typeface="Arial"/>
+              <a:buChar char="»"/>
+              <a:defRPr sz="1800" b="0" i="0" u="none" strike="noStrike" cap="none">
+                <a:solidFill>
+                  <a:schemeClr val="dk2"/>
+                </a:solidFill>
+                <a:latin typeface="Arial"/>
+                <a:ea typeface="Arial"/>
+                <a:cs typeface="Arial"/>
+                <a:sym typeface="Arial"/>
+              </a:defRPr>
+            </a:lvl5pPr>
+            <a:lvl6pPr marL="2743200" marR="0" lvl="5" indent="-342900" algn="l" rtl="0">
+              <a:lnSpc>
+                <a:spcPct val="100000"/>
+              </a:lnSpc>
+              <a:spcBef>
+                <a:spcPts val="360"/>
+              </a:spcBef>
+              <a:spcAft>
+                <a:spcPts val="0"/>
+              </a:spcAft>
+              <a:buClr>
+                <a:schemeClr val="dk1"/>
+              </a:buClr>
+              <a:buSzPts val="1800"/>
+              <a:buFont typeface="Arial"/>
+              <a:buChar char="•"/>
+              <a:defRPr sz="2000" b="0" i="0" u="none" strike="noStrike" cap="none">
+                <a:solidFill>
+                  <a:schemeClr val="dk1"/>
+                </a:solidFill>
+                <a:latin typeface="Arial"/>
+                <a:ea typeface="Arial"/>
+                <a:cs typeface="Arial"/>
+                <a:sym typeface="Arial"/>
+              </a:defRPr>
+            </a:lvl6pPr>
+            <a:lvl7pPr marL="3200400" marR="0" lvl="6" indent="-342900" algn="l" rtl="0">
+              <a:lnSpc>
+                <a:spcPct val="100000"/>
+              </a:lnSpc>
+              <a:spcBef>
+                <a:spcPts val="360"/>
+              </a:spcBef>
+              <a:spcAft>
+                <a:spcPts val="0"/>
+              </a:spcAft>
+              <a:buClr>
+                <a:schemeClr val="dk1"/>
+              </a:buClr>
+              <a:buSzPts val="1800"/>
+              <a:buFont typeface="Arial"/>
+              <a:buChar char="•"/>
+              <a:defRPr sz="2000" b="0" i="0" u="none" strike="noStrike" cap="none">
+                <a:solidFill>
+                  <a:schemeClr val="dk1"/>
+                </a:solidFill>
+                <a:latin typeface="Arial"/>
+                <a:ea typeface="Arial"/>
+                <a:cs typeface="Arial"/>
+                <a:sym typeface="Arial"/>
+              </a:defRPr>
+            </a:lvl7pPr>
+            <a:lvl8pPr marL="3657600" marR="0" lvl="7" indent="-342900" algn="l" rtl="0">
+              <a:lnSpc>
+                <a:spcPct val="100000"/>
+              </a:lnSpc>
+              <a:spcBef>
+                <a:spcPts val="360"/>
+              </a:spcBef>
+              <a:spcAft>
+                <a:spcPts val="0"/>
+              </a:spcAft>
+              <a:buClr>
+                <a:schemeClr val="dk1"/>
+              </a:buClr>
+              <a:buSzPts val="1800"/>
+              <a:buFont typeface="Arial"/>
+              <a:buChar char="•"/>
+              <a:defRPr sz="2000" b="0" i="0" u="none" strike="noStrike" cap="none">
+                <a:solidFill>
+                  <a:schemeClr val="dk1"/>
+                </a:solidFill>
+                <a:latin typeface="Arial"/>
+                <a:ea typeface="Arial"/>
+                <a:cs typeface="Arial"/>
+                <a:sym typeface="Arial"/>
+              </a:defRPr>
+            </a:lvl8pPr>
+            <a:lvl9pPr marL="4114800" marR="0" lvl="8" indent="-342900" algn="l" rtl="0">
+              <a:lnSpc>
+                <a:spcPct val="100000"/>
+              </a:lnSpc>
+              <a:spcBef>
+                <a:spcPts val="360"/>
+              </a:spcBef>
+              <a:spcAft>
+                <a:spcPts val="0"/>
+              </a:spcAft>
+              <a:buClr>
+                <a:schemeClr val="dk1"/>
+              </a:buClr>
+              <a:buSzPts val="1800"/>
+              <a:buFont typeface="Arial"/>
+              <a:buChar char="•"/>
+              <a:defRPr sz="2000" b="0" i="0" u="none" strike="noStrike" cap="none">
+                <a:solidFill>
+                  <a:schemeClr val="dk1"/>
+                </a:solidFill>
+                <a:latin typeface="Arial"/>
+                <a:ea typeface="Arial"/>
+                <a:cs typeface="Arial"/>
+                <a:sym typeface="Arial"/>
+              </a:defRPr>
+            </a:lvl9pPr>
+          </a:lstStyle>
+          <a:p>
+            <a:pPr marL="182880" lvl="1" indent="0" defTabSz="457200">
+              <a:lnSpc>
+                <a:spcPct val="90000"/>
+              </a:lnSpc>
+              <a:buFont typeface="Arial"/>
+              <a:buNone/>
+            </a:pPr>
+            <a:r>
+              <a:rPr lang="en-US" b="1" dirty="0">
+                <a:latin typeface="Courier New" panose="02070309020205020404" pitchFamily="49" charset="0"/>
+                <a:cs typeface="Courier New" panose="02070309020205020404" pitchFamily="49" charset="0"/>
+              </a:rPr>
+              <a:t>CREATE TABLE</a:t>
+            </a:r>
+            <a:r>
+              <a:rPr lang="en-US" dirty="0">
+                <a:latin typeface="Courier New" panose="02070309020205020404" pitchFamily="49" charset="0"/>
+                <a:cs typeface="Courier New" panose="02070309020205020404" pitchFamily="49" charset="0"/>
+              </a:rPr>
+              <a:t> </a:t>
+            </a:r>
+            <a:r>
+              <a:rPr lang="en-US" dirty="0" err="1">
+                <a:latin typeface="Courier New" panose="02070309020205020404" pitchFamily="49" charset="0"/>
+                <a:cs typeface="Courier New" panose="02070309020205020404" pitchFamily="49" charset="0"/>
+              </a:rPr>
+              <a:t>mySchema.mytable</a:t>
+            </a:r>
+            <a:r>
+              <a:rPr lang="en-US" dirty="0">
+                <a:latin typeface="Courier New" panose="02070309020205020404" pitchFamily="49" charset="0"/>
+                <a:cs typeface="Courier New" panose="02070309020205020404" pitchFamily="49" charset="0"/>
+              </a:rPr>
+              <a:t> ( ... )</a:t>
+            </a:r>
+          </a:p>
+          <a:p>
+            <a:pPr marL="182880" lvl="1" indent="0" defTabSz="457200">
+              <a:lnSpc>
+                <a:spcPct val="90000"/>
+              </a:lnSpc>
+              <a:buFont typeface="Arial"/>
+              <a:buNone/>
+            </a:pPr>
+            <a:endParaRPr lang="en-US" sz="1400" dirty="0">
+              <a:latin typeface="Courier New" panose="02070309020205020404" pitchFamily="49" charset="0"/>
+              <a:cs typeface="Courier New" panose="02070309020205020404" pitchFamily="49" charset="0"/>
+            </a:endParaRPr>
+          </a:p>
+        </p:txBody>
+      </p:sp>
+      <p:sp>
+        <p:nvSpPr>
+          <p:cNvPr id="7" name="Google Shape;219;p16">
+            <a:extLst>
+              <a:ext uri="{FF2B5EF4-FFF2-40B4-BE49-F238E27FC236}">
+                <a16:creationId xmlns:a16="http://schemas.microsoft.com/office/drawing/2014/main" id="{256BF2F1-95EE-46EB-A310-CA64686716F3}"/>
+              </a:ext>
+            </a:extLst>
+          </p:cNvPr>
+          <p:cNvSpPr txBox="1">
+            <a:spLocks/>
+          </p:cNvSpPr>
+          <p:nvPr/>
+        </p:nvSpPr>
+        <p:spPr>
+          <a:xfrm>
+            <a:off x="1816848" y="6055945"/>
+            <a:ext cx="5510302" cy="490329"/>
+          </a:xfrm>
+          <a:prstGeom prst="rect">
+            <a:avLst/>
+          </a:prstGeom>
+        </p:spPr>
+        <p:style>
+          <a:lnRef idx="1">
+            <a:schemeClr val="accent2"/>
+          </a:lnRef>
+          <a:fillRef idx="2">
+            <a:schemeClr val="accent2"/>
+          </a:fillRef>
+          <a:effectRef idx="1">
+            <a:schemeClr val="accent2"/>
+          </a:effectRef>
+          <a:fontRef idx="minor">
+            <a:schemeClr val="dk1"/>
+          </a:fontRef>
+        </p:style>
+        <p:txBody>
+          <a:bodyPr spcFirstLastPara="1" wrap="square" lIns="91425" tIns="45700" rIns="91425" bIns="45700" anchor="t" anchorCtr="0">
+            <a:normAutofit fontScale="92500"/>
+          </a:bodyPr>
+          <a:lstStyle>
+            <a:defPPr marR="0" lvl="0" algn="l" rtl="0">
+              <a:lnSpc>
+                <a:spcPct val="100000"/>
+              </a:lnSpc>
+              <a:spcBef>
+                <a:spcPts val="0"/>
+              </a:spcBef>
+              <a:spcAft>
+                <a:spcPts val="0"/>
+              </a:spcAft>
+            </a:defPPr>
+            <a:lvl1pPr marL="457200" marR="0" lvl="0" indent="-406400" algn="l" rtl="0">
+              <a:lnSpc>
+                <a:spcPct val="100000"/>
+              </a:lnSpc>
+              <a:spcBef>
+                <a:spcPts val="560"/>
+              </a:spcBef>
+              <a:spcAft>
+                <a:spcPts val="0"/>
+              </a:spcAft>
+              <a:buClr>
+                <a:schemeClr val="accent1"/>
+              </a:buClr>
+              <a:buSzPts val="2800"/>
+              <a:buFont typeface="Arial"/>
+              <a:buChar char="•"/>
+              <a:defRPr sz="2800" b="0" i="0" u="none" strike="noStrike" cap="none">
+                <a:solidFill>
+                  <a:schemeClr val="dk2"/>
+                </a:solidFill>
+                <a:latin typeface="Arial"/>
+                <a:ea typeface="Arial"/>
+                <a:cs typeface="Arial"/>
+                <a:sym typeface="Arial"/>
+              </a:defRPr>
+            </a:lvl1pPr>
+            <a:lvl2pPr marL="914400" marR="0" lvl="1" indent="-381000" algn="l" rtl="0">
+              <a:lnSpc>
+                <a:spcPct val="100000"/>
+              </a:lnSpc>
+              <a:spcBef>
+                <a:spcPts val="480"/>
+              </a:spcBef>
+              <a:spcAft>
+                <a:spcPts val="0"/>
+              </a:spcAft>
+              <a:buClr>
+                <a:schemeClr val="accent1"/>
+              </a:buClr>
+              <a:buSzPts val="2400"/>
+              <a:buFont typeface="Arial"/>
+              <a:buChar char="–"/>
+              <a:defRPr sz="2400" b="0" i="0" u="none" strike="noStrike" cap="none">
+                <a:solidFill>
+                  <a:schemeClr val="dk2"/>
+                </a:solidFill>
+                <a:latin typeface="Arial"/>
+                <a:ea typeface="Arial"/>
+                <a:cs typeface="Arial"/>
+                <a:sym typeface="Arial"/>
+              </a:defRPr>
+            </a:lvl2pPr>
+            <a:lvl3pPr marL="1371600" marR="0" lvl="2" indent="-355600" algn="l" rtl="0">
+              <a:lnSpc>
+                <a:spcPct val="100000"/>
+              </a:lnSpc>
+              <a:spcBef>
+                <a:spcPts val="400"/>
+              </a:spcBef>
+              <a:spcAft>
+                <a:spcPts val="0"/>
+              </a:spcAft>
+              <a:buClr>
+                <a:schemeClr val="accent1"/>
+              </a:buClr>
+              <a:buSzPts val="2000"/>
+              <a:buFont typeface="Arial"/>
+              <a:buChar char="•"/>
+              <a:defRPr sz="2000" b="0" i="0" u="none" strike="noStrike" cap="none">
+                <a:solidFill>
+                  <a:schemeClr val="dk2"/>
+                </a:solidFill>
+                <a:latin typeface="Arial"/>
+                <a:ea typeface="Arial"/>
+                <a:cs typeface="Arial"/>
+                <a:sym typeface="Arial"/>
+              </a:defRPr>
+            </a:lvl3pPr>
+            <a:lvl4pPr marL="1828800" marR="0" lvl="3" indent="-342900" algn="l" rtl="0">
+              <a:lnSpc>
+                <a:spcPct val="100000"/>
+              </a:lnSpc>
+              <a:spcBef>
+                <a:spcPts val="360"/>
+              </a:spcBef>
+              <a:spcAft>
+                <a:spcPts val="0"/>
+              </a:spcAft>
+              <a:buClr>
+                <a:schemeClr val="accent1"/>
+              </a:buClr>
+              <a:buSzPts val="1800"/>
+              <a:buFont typeface="Arial"/>
+              <a:buChar char="–"/>
+              <a:defRPr sz="1800" b="0" i="0" u="none" strike="noStrike" cap="none">
+                <a:solidFill>
+                  <a:schemeClr val="dk2"/>
+                </a:solidFill>
+                <a:latin typeface="Arial"/>
+                <a:ea typeface="Arial"/>
+                <a:cs typeface="Arial"/>
+                <a:sym typeface="Arial"/>
+              </a:defRPr>
+            </a:lvl4pPr>
+            <a:lvl5pPr marL="2286000" marR="0" lvl="4" indent="-342900" algn="l" rtl="0">
+              <a:lnSpc>
+                <a:spcPct val="100000"/>
+              </a:lnSpc>
+              <a:spcBef>
+                <a:spcPts val="360"/>
+              </a:spcBef>
+              <a:spcAft>
+                <a:spcPts val="0"/>
+              </a:spcAft>
+              <a:buClr>
+                <a:schemeClr val="accent1"/>
+              </a:buClr>
+              <a:buSzPts val="1800"/>
+              <a:buFont typeface="Arial"/>
+              <a:buChar char="»"/>
+              <a:defRPr sz="1800" b="0" i="0" u="none" strike="noStrike" cap="none">
+                <a:solidFill>
+                  <a:schemeClr val="dk2"/>
+                </a:solidFill>
+                <a:latin typeface="Arial"/>
+                <a:ea typeface="Arial"/>
+                <a:cs typeface="Arial"/>
+                <a:sym typeface="Arial"/>
+              </a:defRPr>
+            </a:lvl5pPr>
+            <a:lvl6pPr marL="2743200" marR="0" lvl="5" indent="-342900" algn="l" rtl="0">
+              <a:lnSpc>
+                <a:spcPct val="100000"/>
+              </a:lnSpc>
+              <a:spcBef>
+                <a:spcPts val="360"/>
+              </a:spcBef>
+              <a:spcAft>
+                <a:spcPts val="0"/>
+              </a:spcAft>
+              <a:buClr>
+                <a:schemeClr val="dk1"/>
+              </a:buClr>
+              <a:buSzPts val="1800"/>
+              <a:buFont typeface="Arial"/>
+              <a:buChar char="•"/>
+              <a:defRPr sz="2000" b="0" i="0" u="none" strike="noStrike" cap="none">
+                <a:solidFill>
+                  <a:schemeClr val="dk1"/>
+                </a:solidFill>
+                <a:latin typeface="Arial"/>
+                <a:ea typeface="Arial"/>
+                <a:cs typeface="Arial"/>
+                <a:sym typeface="Arial"/>
+              </a:defRPr>
+            </a:lvl6pPr>
+            <a:lvl7pPr marL="3200400" marR="0" lvl="6" indent="-342900" algn="l" rtl="0">
+              <a:lnSpc>
+                <a:spcPct val="100000"/>
+              </a:lnSpc>
+              <a:spcBef>
+                <a:spcPts val="360"/>
+              </a:spcBef>
+              <a:spcAft>
+                <a:spcPts val="0"/>
+              </a:spcAft>
+              <a:buClr>
+                <a:schemeClr val="dk1"/>
+              </a:buClr>
+              <a:buSzPts val="1800"/>
+              <a:buFont typeface="Arial"/>
+              <a:buChar char="•"/>
+              <a:defRPr sz="2000" b="0" i="0" u="none" strike="noStrike" cap="none">
+                <a:solidFill>
+                  <a:schemeClr val="dk1"/>
+                </a:solidFill>
+                <a:latin typeface="Arial"/>
+                <a:ea typeface="Arial"/>
+                <a:cs typeface="Arial"/>
+                <a:sym typeface="Arial"/>
+              </a:defRPr>
+            </a:lvl7pPr>
+            <a:lvl8pPr marL="3657600" marR="0" lvl="7" indent="-342900" algn="l" rtl="0">
+              <a:lnSpc>
+                <a:spcPct val="100000"/>
+              </a:lnSpc>
+              <a:spcBef>
+                <a:spcPts val="360"/>
+              </a:spcBef>
+              <a:spcAft>
+                <a:spcPts val="0"/>
+              </a:spcAft>
+              <a:buClr>
+                <a:schemeClr val="dk1"/>
+              </a:buClr>
+              <a:buSzPts val="1800"/>
+              <a:buFont typeface="Arial"/>
+              <a:buChar char="•"/>
+              <a:defRPr sz="2000" b="0" i="0" u="none" strike="noStrike" cap="none">
+                <a:solidFill>
+                  <a:schemeClr val="dk1"/>
+                </a:solidFill>
+                <a:latin typeface="Arial"/>
+                <a:ea typeface="Arial"/>
+                <a:cs typeface="Arial"/>
+                <a:sym typeface="Arial"/>
+              </a:defRPr>
+            </a:lvl8pPr>
+            <a:lvl9pPr marL="4114800" marR="0" lvl="8" indent="-342900" algn="l" rtl="0">
+              <a:lnSpc>
+                <a:spcPct val="100000"/>
+              </a:lnSpc>
+              <a:spcBef>
+                <a:spcPts val="360"/>
+              </a:spcBef>
+              <a:spcAft>
+                <a:spcPts val="0"/>
+              </a:spcAft>
+              <a:buClr>
+                <a:schemeClr val="dk1"/>
+              </a:buClr>
+              <a:buSzPts val="1800"/>
+              <a:buFont typeface="Arial"/>
+              <a:buChar char="•"/>
+              <a:defRPr sz="2000" b="0" i="0" u="none" strike="noStrike" cap="none">
+                <a:solidFill>
+                  <a:schemeClr val="dk1"/>
+                </a:solidFill>
+                <a:latin typeface="Arial"/>
+                <a:ea typeface="Arial"/>
+                <a:cs typeface="Arial"/>
+                <a:sym typeface="Arial"/>
+              </a:defRPr>
+            </a:lvl9pPr>
+          </a:lstStyle>
+          <a:p>
+            <a:pPr marL="182880" lvl="1" indent="0" defTabSz="457200">
+              <a:lnSpc>
+                <a:spcPct val="90000"/>
+              </a:lnSpc>
+              <a:buFont typeface="Arial"/>
+              <a:buNone/>
+            </a:pPr>
+            <a:r>
+              <a:rPr lang="en-US" b="1" dirty="0">
+                <a:latin typeface="Courier New" panose="02070309020205020404" pitchFamily="49" charset="0"/>
+                <a:cs typeface="Courier New" panose="02070309020205020404" pitchFamily="49" charset="0"/>
+              </a:rPr>
+              <a:t>DROP SCHEMA</a:t>
+            </a:r>
+            <a:r>
+              <a:rPr lang="en-US" dirty="0">
+                <a:latin typeface="Courier New" panose="02070309020205020404" pitchFamily="49" charset="0"/>
+                <a:cs typeface="Courier New" panose="02070309020205020404" pitchFamily="49" charset="0"/>
+              </a:rPr>
+              <a:t> </a:t>
+            </a:r>
+            <a:r>
+              <a:rPr lang="en-US" dirty="0" err="1">
+                <a:latin typeface="Courier New" panose="02070309020205020404" pitchFamily="49" charset="0"/>
+                <a:cs typeface="Courier New" panose="02070309020205020404" pitchFamily="49" charset="0"/>
+              </a:rPr>
+              <a:t>mySchema</a:t>
+            </a:r>
+            <a:r>
+              <a:rPr lang="en-US" dirty="0">
+                <a:latin typeface="Courier New" panose="02070309020205020404" pitchFamily="49" charset="0"/>
+                <a:cs typeface="Courier New" panose="02070309020205020404" pitchFamily="49" charset="0"/>
+              </a:rPr>
+              <a:t> </a:t>
+            </a:r>
+            <a:r>
+              <a:rPr lang="en-US" b="1" dirty="0">
+                <a:latin typeface="Courier New" panose="02070309020205020404" pitchFamily="49" charset="0"/>
+                <a:cs typeface="Courier New" panose="02070309020205020404" pitchFamily="49" charset="0"/>
+              </a:rPr>
+              <a:t>CASCADE</a:t>
+            </a:r>
+            <a:r>
+              <a:rPr lang="en-US" dirty="0">
+                <a:latin typeface="Courier New" panose="02070309020205020404" pitchFamily="49" charset="0"/>
+                <a:cs typeface="Courier New" panose="02070309020205020404" pitchFamily="49" charset="0"/>
+              </a:rPr>
+              <a:t>;</a:t>
+            </a:r>
+          </a:p>
+          <a:p>
+            <a:pPr marL="182880" lvl="1" indent="0" defTabSz="457200">
+              <a:lnSpc>
+                <a:spcPct val="90000"/>
+              </a:lnSpc>
+              <a:buFont typeface="Arial"/>
+              <a:buNone/>
+            </a:pPr>
+            <a:endParaRPr lang="en-US" sz="1400" dirty="0">
+              <a:latin typeface="Courier New" panose="02070309020205020404" pitchFamily="49" charset="0"/>
+              <a:cs typeface="Courier New" panose="02070309020205020404" pitchFamily="49" charset="0"/>
+            </a:endParaRPr>
+          </a:p>
+        </p:txBody>
+      </p:sp>
+    </p:spTree>
+    <p:extLst>
+      <p:ext uri="{BB962C8B-B14F-4D97-AF65-F5344CB8AC3E}">
+        <p14:creationId xmlns:p14="http://schemas.microsoft.com/office/powerpoint/2010/main" val="1742137089"/>
+      </p:ext>
+    </p:extLst>
+  </p:cSld>
+  <p:clrMapOvr>
+    <a:masterClrMapping/>
+  </p:clrMapOvr>
+  <p:timing>
+    <p:tnLst>
+      <p:par>
+        <p:cTn id="1" dur="indefinite" restart="never" nodeType="tmRoot">
+          <p:childTnLst>
+            <p:seq concurrent="1" nextAc="seek">
+              <p:cTn id="2" dur="indefinite" nodeType="mainSeq">
+                <p:childTnLst>
+                  <p:par>
+                    <p:cTn id="3" fill="hold">
+                      <p:stCondLst>
+                        <p:cond delay="indefinite"/>
+                      </p:stCondLst>
+                      <p:childTnLst>
+                        <p:par>
+                          <p:cTn id="4" fill="hold">
+                            <p:stCondLst>
+                              <p:cond delay="0"/>
+                            </p:stCondLst>
+                            <p:childTnLst>
+                              <p:par>
+                                <p:cTn id="5" presetID="1" presetClass="entr" presetSubtype="0" fill="hold" grpId="0" nodeType="clickEffect">
+                                  <p:stCondLst>
+                                    <p:cond delay="0"/>
+                                  </p:stCondLst>
+                                  <p:childTnLst>
+                                    <p:set>
+                                      <p:cBhvr>
+                                        <p:cTn id="6" dur="1" fill="hold">
+                                          <p:stCondLst>
+                                            <p:cond delay="0"/>
+                                          </p:stCondLst>
+                                        </p:cTn>
+                                        <p:tgtEl>
+                                          <p:spTgt spid="5">
+                                            <p:bg/>
+                                          </p:spTgt>
+                                        </p:tgtEl>
+                                        <p:attrNameLst>
+                                          <p:attrName>style.visibility</p:attrName>
+                                        </p:attrNameLst>
+                                      </p:cBhvr>
+                                      <p:to>
+                                        <p:strVal val="visible"/>
+                                      </p:to>
+                                    </p:set>
+                                  </p:childTnLst>
+                                </p:cTn>
+                              </p:par>
+                            </p:childTnLst>
+                          </p:cTn>
+                        </p:par>
+                      </p:childTnLst>
+                    </p:cTn>
+                  </p:par>
+                  <p:par>
+                    <p:cTn id="7" fill="hold">
+                      <p:stCondLst>
+                        <p:cond delay="indefinite"/>
+                      </p:stCondLst>
+                      <p:childTnLst>
+                        <p:par>
+                          <p:cTn id="8" fill="hold">
+                            <p:stCondLst>
+                              <p:cond delay="0"/>
+                            </p:stCondLst>
+                            <p:childTnLst>
+                              <p:par>
+                                <p:cTn id="9" presetID="1" presetClass="entr" presetSubtype="0" fill="hold" grpId="0" nodeType="clickEffect">
+                                  <p:stCondLst>
+                                    <p:cond delay="0"/>
+                                  </p:stCondLst>
+                                  <p:childTnLst>
+                                    <p:set>
+                                      <p:cBhvr>
+                                        <p:cTn id="10" dur="1" fill="hold">
+                                          <p:stCondLst>
+                                            <p:cond delay="0"/>
+                                          </p:stCondLst>
+                                        </p:cTn>
+                                        <p:tgtEl>
+                                          <p:spTgt spid="5">
+                                            <p:txEl>
+                                              <p:pRg st="0" end="0"/>
+                                            </p:txEl>
+                                          </p:spTgt>
+                                        </p:tgtEl>
+                                        <p:attrNameLst>
+                                          <p:attrName>style.visibility</p:attrName>
+                                        </p:attrNameLst>
+                                      </p:cBhvr>
+                                      <p:to>
+                                        <p:strVal val="visible"/>
+                                      </p:to>
+                                    </p:set>
+                                  </p:childTnLst>
+                                </p:cTn>
+                              </p:par>
+                            </p:childTnLst>
+                          </p:cTn>
+                        </p:par>
+                      </p:childTnLst>
+                    </p:cTn>
+                  </p:par>
+                  <p:par>
+                    <p:cTn id="11" fill="hold">
+                      <p:stCondLst>
+                        <p:cond delay="indefinite"/>
+                      </p:stCondLst>
+                      <p:childTnLst>
+                        <p:par>
+                          <p:cTn id="12" fill="hold">
+                            <p:stCondLst>
+                              <p:cond delay="0"/>
+                            </p:stCondLst>
+                            <p:childTnLst>
+                              <p:par>
+                                <p:cTn id="13" presetID="1" presetClass="entr" presetSubtype="0" fill="hold" grpId="0" nodeType="clickEffect">
+                                  <p:stCondLst>
+                                    <p:cond delay="0"/>
+                                  </p:stCondLst>
+                                  <p:childTnLst>
+                                    <p:set>
+                                      <p:cBhvr>
+                                        <p:cTn id="14" dur="1" fill="hold">
+                                          <p:stCondLst>
+                                            <p:cond delay="0"/>
+                                          </p:stCondLst>
+                                        </p:cTn>
+                                        <p:tgtEl>
+                                          <p:spTgt spid="6">
+                                            <p:bg/>
+                                          </p:spTgt>
+                                        </p:tgtEl>
+                                        <p:attrNameLst>
+                                          <p:attrName>style.visibility</p:attrName>
+                                        </p:attrNameLst>
+                                      </p:cBhvr>
+                                      <p:to>
+                                        <p:strVal val="visible"/>
+                                      </p:to>
+                                    </p:set>
+                                  </p:childTnLst>
+                                </p:cTn>
+                              </p:par>
+                            </p:childTnLst>
+                          </p:cTn>
+                        </p:par>
+                      </p:childTnLst>
+                    </p:cTn>
+                  </p:par>
+                  <p:par>
+                    <p:cTn id="15" fill="hold">
+                      <p:stCondLst>
+                        <p:cond delay="indefinite"/>
+                      </p:stCondLst>
+                      <p:childTnLst>
+                        <p:par>
+                          <p:cTn id="16" fill="hold">
+                            <p:stCondLst>
+                              <p:cond delay="0"/>
+                            </p:stCondLst>
+                            <p:childTnLst>
+                              <p:par>
+                                <p:cTn id="17" presetID="1" presetClass="entr" presetSubtype="0" fill="hold" grpId="0" nodeType="clickEffect">
+                                  <p:stCondLst>
+                                    <p:cond delay="0"/>
+                                  </p:stCondLst>
+                                  <p:childTnLst>
+                                    <p:set>
+                                      <p:cBhvr>
+                                        <p:cTn id="18" dur="1" fill="hold">
+                                          <p:stCondLst>
+                                            <p:cond delay="0"/>
+                                          </p:stCondLst>
+                                        </p:cTn>
+                                        <p:tgtEl>
+                                          <p:spTgt spid="6">
+                                            <p:txEl>
+                                              <p:pRg st="0" end="0"/>
+                                            </p:txEl>
+                                          </p:spTgt>
+                                        </p:tgtEl>
+                                        <p:attrNameLst>
+                                          <p:attrName>style.visibility</p:attrName>
+                                        </p:attrNameLst>
+                                      </p:cBhvr>
+                                      <p:to>
+                                        <p:strVal val="visible"/>
+                                      </p:to>
+                                    </p:set>
+                                  </p:childTnLst>
+                                </p:cTn>
+                              </p:par>
+                            </p:childTnLst>
+                          </p:cTn>
+                        </p:par>
+                      </p:childTnLst>
+                    </p:cTn>
+                  </p:par>
+                  <p:par>
+                    <p:cTn id="19" fill="hold">
+                      <p:stCondLst>
+                        <p:cond delay="indefinite"/>
+                      </p:stCondLst>
+                      <p:childTnLst>
+                        <p:par>
+                          <p:cTn id="20" fill="hold">
+                            <p:stCondLst>
+                              <p:cond delay="0"/>
+                            </p:stCondLst>
+                            <p:childTnLst>
+                              <p:par>
+                                <p:cTn id="21" presetID="1" presetClass="entr" presetSubtype="0" fill="hold" grpId="0" nodeType="clickEffect">
+                                  <p:stCondLst>
+                                    <p:cond delay="0"/>
+                                  </p:stCondLst>
+                                  <p:childTnLst>
+                                    <p:set>
+                                      <p:cBhvr>
+                                        <p:cTn id="22" dur="1" fill="hold">
+                                          <p:stCondLst>
+                                            <p:cond delay="0"/>
+                                          </p:stCondLst>
+                                        </p:cTn>
+                                        <p:tgtEl>
+                                          <p:spTgt spid="7">
+                                            <p:bg/>
+                                          </p:spTgt>
+                                        </p:tgtEl>
+                                        <p:attrNameLst>
+                                          <p:attrName>style.visibility</p:attrName>
+                                        </p:attrNameLst>
+                                      </p:cBhvr>
+                                      <p:to>
+                                        <p:strVal val="visible"/>
+                                      </p:to>
+                                    </p:set>
+                                  </p:childTnLst>
+                                </p:cTn>
+                              </p:par>
+                            </p:childTnLst>
+                          </p:cTn>
+                        </p:par>
+                      </p:childTnLst>
+                    </p:cTn>
+                  </p:par>
+                  <p:par>
+                    <p:cTn id="23" fill="hold">
+                      <p:stCondLst>
+                        <p:cond delay="indefinite"/>
+                      </p:stCondLst>
+                      <p:childTnLst>
+                        <p:par>
+                          <p:cTn id="24" fill="hold">
+                            <p:stCondLst>
+                              <p:cond delay="0"/>
+                            </p:stCondLst>
+                            <p:childTnLst>
+                              <p:par>
+                                <p:cTn id="25" presetID="1" presetClass="entr" presetSubtype="0" fill="hold" grpId="0" nodeType="clickEffect">
+                                  <p:stCondLst>
+                                    <p:cond delay="0"/>
+                                  </p:stCondLst>
+                                  <p:childTnLst>
+                                    <p:set>
+                                      <p:cBhvr>
+                                        <p:cTn id="26" dur="1" fill="hold">
+                                          <p:stCondLst>
+                                            <p:cond delay="0"/>
+                                          </p:stCondLst>
+                                        </p:cTn>
+                                        <p:tgtEl>
+                                          <p:spTgt spid="7">
+                                            <p:txEl>
+                                              <p:pRg st="0" end="0"/>
+                                            </p:txEl>
+                                          </p:spTgt>
+                                        </p:tgtEl>
+                                        <p:attrNameLst>
+                                          <p:attrName>style.visibility</p:attrName>
+                                        </p:attrNameLst>
+                                      </p:cBhvr>
+                                      <p:to>
+                                        <p:strVal val="visible"/>
+                                      </p:to>
+                                    </p:set>
+                                  </p:childTnLst>
+                                </p:cTn>
+                              </p:par>
+                            </p:childTnLst>
+                          </p:cTn>
+                        </p:par>
+                      </p:childTnLst>
+                    </p:cTn>
+                  </p:par>
+                </p:childTnLst>
+              </p:cTn>
+              <p:prevCondLst>
+                <p:cond evt="onPrev" delay="0">
+                  <p:tgtEl>
+                    <p:sldTgt/>
+                  </p:tgtEl>
+                </p:cond>
+              </p:prevCondLst>
+              <p:nextCondLst>
+                <p:cond evt="onNext" delay="0">
+                  <p:tgtEl>
+                    <p:sldTgt/>
+                  </p:tgtEl>
+                </p:cond>
+              </p:nextCondLst>
+            </p:seq>
+          </p:childTnLst>
+        </p:cTn>
+      </p:par>
+    </p:tnLst>
+    <p:bldLst>
+      <p:bldP spid="5" grpId="0" uiExpand="1" build="p" animBg="1"/>
+      <p:bldP spid="6" grpId="0" uiExpand="1" build="p" animBg="1"/>
+      <p:bldP spid="7" grpId="0" uiExpand="1" build="p" animBg="1"/>
+    </p:bldLst>
+  </p:timing>
+</p:sld>
+</file>
+
+<file path=ppt/slides/slide5.xml><?xml version="1.0" encoding="utf-8"?>
+<p:sld xmlns:a="http://schemas.openxmlformats.org/drawingml/2006/main" xmlns:r="http://schemas.openxmlformats.org/officeDocument/2006/relationships" xmlns:p="http://schemas.openxmlformats.org/presentationml/2006/main">
+  <p:cSld>
+    <p:spTree>
+      <p:nvGrpSpPr>
+        <p:cNvPr id="1" name=""/>
+        <p:cNvGrpSpPr/>
+        <p:nvPr/>
+      </p:nvGrpSpPr>
+      <p:grpSpPr>
+        <a:xfrm>
+          <a:off x="0" y="0"/>
+          <a:ext cx="0" cy="0"/>
+          <a:chOff x="0" y="0"/>
+          <a:chExt cx="0" cy="0"/>
+        </a:xfrm>
+      </p:grpSpPr>
+      <p:sp>
+        <p:nvSpPr>
+          <p:cNvPr id="2" name="Title 1">
+            <a:extLst>
+              <a:ext uri="{FF2B5EF4-FFF2-40B4-BE49-F238E27FC236}">
+                <a16:creationId xmlns:a16="http://schemas.microsoft.com/office/drawing/2014/main" id="{437930B4-E996-4435-B9F1-D407853E2C03}"/>
+              </a:ext>
+            </a:extLst>
+          </p:cNvPr>
+          <p:cNvSpPr>
+            <a:spLocks noGrp="1"/>
+          </p:cNvSpPr>
+          <p:nvPr>
+            <p:ph type="title"/>
+          </p:nvPr>
+        </p:nvSpPr>
+        <p:spPr/>
+        <p:txBody>
+          <a:bodyPr/>
+          <a:lstStyle/>
+          <a:p>
+            <a:r>
+              <a:rPr lang="en-US" dirty="0"/>
+              <a:t>SQL Naming Conventions</a:t>
+            </a:r>
+          </a:p>
+        </p:txBody>
+      </p:sp>
+      <p:sp>
+        <p:nvSpPr>
+          <p:cNvPr id="3" name="Text Placeholder 2">
+            <a:extLst>
+              <a:ext uri="{FF2B5EF4-FFF2-40B4-BE49-F238E27FC236}">
+                <a16:creationId xmlns:a16="http://schemas.microsoft.com/office/drawing/2014/main" id="{0C6BA468-B2FB-4410-8CC4-82872A4103B6}"/>
+              </a:ext>
+            </a:extLst>
+          </p:cNvPr>
+          <p:cNvSpPr>
+            <a:spLocks noGrp="1"/>
+          </p:cNvSpPr>
+          <p:nvPr>
+            <p:ph type="body" idx="1"/>
+          </p:nvPr>
+        </p:nvSpPr>
+        <p:spPr>
+          <a:xfrm>
+            <a:off x="380010" y="1481446"/>
+            <a:ext cx="8383980" cy="4882266"/>
+          </a:xfrm>
+        </p:spPr>
+        <p:txBody>
+          <a:bodyPr>
+            <a:normAutofit/>
+          </a:bodyPr>
+          <a:lstStyle/>
+          <a:p>
+            <a:r>
+              <a:rPr lang="en-US" dirty="0"/>
+              <a:t>In SQL, the definition for tables and keywords are NOT case sensitive, however values within a database are. Typically, SQL naming convention are as follows:</a:t>
+            </a:r>
+          </a:p>
+          <a:p>
+            <a:pPr lvl="1"/>
+            <a:r>
+              <a:rPr lang="en-US" b="1" dirty="0"/>
+              <a:t>KEYWORDS</a:t>
+            </a:r>
+            <a:r>
+              <a:rPr lang="en-US" dirty="0"/>
+              <a:t> – All  Uppercase</a:t>
+            </a:r>
+          </a:p>
+          <a:p>
+            <a:pPr lvl="1"/>
+            <a:r>
+              <a:rPr lang="en-US" i="1" dirty="0"/>
+              <a:t>table and column names </a:t>
+            </a:r>
+            <a:r>
+              <a:rPr lang="en-US" dirty="0"/>
+              <a:t>– All Lowercase</a:t>
+            </a:r>
+          </a:p>
+        </p:txBody>
+      </p:sp>
+      <p:sp>
+        <p:nvSpPr>
+          <p:cNvPr id="4" name="Slide Number Placeholder 3">
+            <a:extLst>
+              <a:ext uri="{FF2B5EF4-FFF2-40B4-BE49-F238E27FC236}">
+                <a16:creationId xmlns:a16="http://schemas.microsoft.com/office/drawing/2014/main" id="{483A7CCD-D4F0-4527-9651-963B2389435E}"/>
+              </a:ext>
+            </a:extLst>
+          </p:cNvPr>
+          <p:cNvSpPr>
+            <a:spLocks noGrp="1"/>
+          </p:cNvSpPr>
+          <p:nvPr>
+            <p:ph type="sldNum" idx="12"/>
+          </p:nvPr>
+        </p:nvSpPr>
+        <p:spPr/>
+        <p:txBody>
+          <a:bodyPr/>
+          <a:lstStyle/>
+          <a:p>
+            <a:pPr marL="0" lvl="0" indent="0" algn="r" rtl="0">
+              <a:spcBef>
+                <a:spcPts val="0"/>
+              </a:spcBef>
+              <a:spcAft>
+                <a:spcPts val="0"/>
+              </a:spcAft>
+              <a:buNone/>
+            </a:pPr>
+            <a:fld id="{00000000-1234-1234-1234-123412341234}" type="slidenum">
+              <a:rPr lang="en-US" smtClean="0"/>
+              <a:t>4</a:t>
+            </a:fld>
+            <a:endParaRPr lang="en-US"/>
+          </a:p>
+        </p:txBody>
+      </p:sp>
+    </p:spTree>
+    <p:extLst>
+      <p:ext uri="{BB962C8B-B14F-4D97-AF65-F5344CB8AC3E}">
+        <p14:creationId xmlns:p14="http://schemas.microsoft.com/office/powerpoint/2010/main" val="2013507064"/>
+      </p:ext>
+    </p:extLst>
+  </p:cSld>
+  <p:clrMapOvr>
+    <a:masterClrMapping/>
+  </p:clrMapOvr>
+</p:sld>
+</file>
+
+<file path=ppt/slides/slide6.xml><?xml version="1.0" encoding="utf-8"?>
+<p:sld xmlns:a="http://schemas.openxmlformats.org/drawingml/2006/main" xmlns:r="http://schemas.openxmlformats.org/officeDocument/2006/relationships" xmlns:p="http://schemas.openxmlformats.org/presentationml/2006/main">
+  <p:cSld>
+    <p:spTree>
+      <p:nvGrpSpPr>
+        <p:cNvPr id="1" name=""/>
+        <p:cNvGrpSpPr/>
+        <p:nvPr/>
+      </p:nvGrpSpPr>
+      <p:grpSpPr>
+        <a:xfrm>
+          <a:off x="0" y="0"/>
+          <a:ext cx="0" cy="0"/>
+          <a:chOff x="0" y="0"/>
+          <a:chExt cx="0" cy="0"/>
+        </a:xfrm>
+      </p:grpSpPr>
+      <p:sp>
+        <p:nvSpPr>
+          <p:cNvPr id="2" name="Title 1">
+            <a:extLst>
+              <a:ext uri="{FF2B5EF4-FFF2-40B4-BE49-F238E27FC236}">
                 <a16:creationId xmlns:a16="http://schemas.microsoft.com/office/drawing/2014/main" id="{49AB3321-D1A4-4382-85A5-94B3D4E5C828}"/>
               </a:ext>
             </a:extLst>
@@ -37105,7 +40296,7 @@
             <a:fld id="{F6728BC2-ACA3-447C-A909-F3F49211C066}" type="slidenum">
               <a:rPr lang="en-US" smtClean="0"/>
               <a:pPr/>
-              <a:t>2</a:t>
+              <a:t>5</a:t>
             </a:fld>
             <a:endParaRPr lang="en-US" dirty="0"/>
           </a:p>
@@ -37124,7 +40315,7 @@
 </p:sld>
 </file>
 
-<file path=ppt/slides/slide4.xml><?xml version="1.0" encoding="utf-8"?>
+<file path=ppt/slides/slide7.xml><?xml version="1.0" encoding="utf-8"?>
 <p:sld xmlns:a="http://schemas.openxmlformats.org/drawingml/2006/main" xmlns:r="http://schemas.openxmlformats.org/officeDocument/2006/relationships" xmlns:p="http://schemas.openxmlformats.org/presentationml/2006/main">
   <p:cSld>
     <p:spTree>
@@ -37350,10 +40541,9 @@
               </a:lnSpc>
             </a:pPr>
             <a:r>
-              <a:rPr lang="en-US" dirty="0" err="1"/>
-              <a:t>Bytea</a:t>
+              <a:rPr lang="en-US" dirty="0"/>
+              <a:t>Byte</a:t>
             </a:r>
-            <a:endParaRPr lang="en-US" dirty="0"/>
           </a:p>
         </p:txBody>
       </p:sp>
@@ -37381,7 +40571,7 @@
             <a:fld id="{F6728BC2-ACA3-447C-A909-F3F49211C066}" type="slidenum">
               <a:rPr lang="en-US" smtClean="0"/>
               <a:pPr/>
-              <a:t>3</a:t>
+              <a:t>6</a:t>
             </a:fld>
             <a:endParaRPr lang="en-US" dirty="0"/>
           </a:p>
@@ -37400,7 +40590,7 @@
 </p:sld>
 </file>
 
-<file path=ppt/slides/slide5.xml><?xml version="1.0" encoding="utf-8"?>
+<file path=ppt/slides/slide8.xml><?xml version="1.0" encoding="utf-8"?>
 <p:sld xmlns:a="http://schemas.openxmlformats.org/drawingml/2006/main" xmlns:r="http://schemas.openxmlformats.org/officeDocument/2006/relationships" xmlns:p="http://schemas.openxmlformats.org/presentationml/2006/main">
   <p:cSld>
     <p:spTree>
@@ -37541,7 +40731,7 @@
             <a:fld id="{F6728BC2-ACA3-447C-A909-F3F49211C066}" type="slidenum">
               <a:rPr lang="en-US" smtClean="0"/>
               <a:pPr/>
-              <a:t>4</a:t>
+              <a:t>7</a:t>
             </a:fld>
             <a:endParaRPr lang="en-US" dirty="0"/>
           </a:p>
@@ -37560,7 +40750,7 @@
 </p:sld>
 </file>
 
-<file path=ppt/slides/slide6.xml><?xml version="1.0" encoding="utf-8"?>
+<file path=ppt/slides/slide9.xml><?xml version="1.0" encoding="utf-8"?>
 <p:sld xmlns:a="http://schemas.openxmlformats.org/drawingml/2006/main" xmlns:r="http://schemas.openxmlformats.org/officeDocument/2006/relationships" xmlns:p="http://schemas.openxmlformats.org/presentationml/2006/main">
   <p:cSld>
     <p:spTree>
@@ -37872,7 +41062,7 @@
             <a:fld id="{F6728BC2-ACA3-447C-A909-F3F49211C066}" type="slidenum">
               <a:rPr lang="en-US" smtClean="0"/>
               <a:pPr/>
-              <a:t>5</a:t>
+              <a:t>8</a:t>
             </a:fld>
             <a:endParaRPr lang="en-US" dirty="0"/>
           </a:p>
@@ -37969,586 +41159,6 @@
     <p:extLst>
       <p:ext uri="{BB962C8B-B14F-4D97-AF65-F5344CB8AC3E}">
         <p14:creationId xmlns:p14="http://schemas.microsoft.com/office/powerpoint/2010/main" val="1566948813"/>
-      </p:ext>
-    </p:extLst>
-  </p:cSld>
-  <p:clrMapOvr>
-    <a:masterClrMapping/>
-  </p:clrMapOvr>
-</p:sld>
-</file>
-
-<file path=ppt/slides/slide7.xml><?xml version="1.0" encoding="utf-8"?>
-<p:sld xmlns:a="http://schemas.openxmlformats.org/drawingml/2006/main" xmlns:r="http://schemas.openxmlformats.org/officeDocument/2006/relationships" xmlns:p="http://schemas.openxmlformats.org/presentationml/2006/main">
-  <p:cSld>
-    <p:spTree>
-      <p:nvGrpSpPr>
-        <p:cNvPr id="1" name=""/>
-        <p:cNvGrpSpPr/>
-        <p:nvPr/>
-      </p:nvGrpSpPr>
-      <p:grpSpPr>
-        <a:xfrm>
-          <a:off x="0" y="0"/>
-          <a:ext cx="0" cy="0"/>
-          <a:chOff x="0" y="0"/>
-          <a:chExt cx="0" cy="0"/>
-        </a:xfrm>
-      </p:grpSpPr>
-      <p:sp>
-        <p:nvSpPr>
-          <p:cNvPr id="2" name="Title 1">
-            <a:extLst>
-              <a:ext uri="{FF2B5EF4-FFF2-40B4-BE49-F238E27FC236}">
-                <a16:creationId xmlns:a16="http://schemas.microsoft.com/office/drawing/2014/main" id="{45425330-57A0-4A2B-A79A-1DDAD21FFC67}"/>
-              </a:ext>
-            </a:extLst>
-          </p:cNvPr>
-          <p:cNvSpPr>
-            <a:spLocks noGrp="1"/>
-          </p:cNvSpPr>
-          <p:nvPr>
-            <p:ph type="title"/>
-          </p:nvPr>
-        </p:nvSpPr>
-        <p:spPr/>
-        <p:txBody>
-          <a:bodyPr/>
-          <a:lstStyle/>
-          <a:p>
-            <a:r>
-              <a:rPr lang="en-US" dirty="0"/>
-              <a:t>Create a Schema</a:t>
-            </a:r>
-          </a:p>
-        </p:txBody>
-      </p:sp>
-      <p:sp>
-        <p:nvSpPr>
-          <p:cNvPr id="3" name="Content Placeholder 2">
-            <a:extLst>
-              <a:ext uri="{FF2B5EF4-FFF2-40B4-BE49-F238E27FC236}">
-                <a16:creationId xmlns:a16="http://schemas.microsoft.com/office/drawing/2014/main" id="{78D93E8E-9097-452F-8B38-5310D9A9044E}"/>
-              </a:ext>
-            </a:extLst>
-          </p:cNvPr>
-          <p:cNvSpPr>
-            <a:spLocks noGrp="1"/>
-          </p:cNvSpPr>
-          <p:nvPr>
-            <p:ph idx="1"/>
-          </p:nvPr>
-        </p:nvSpPr>
-        <p:spPr>
-          <a:gradFill flip="none" rotWithShape="1">
-            <a:gsLst>
-              <a:gs pos="0">
-                <a:schemeClr val="accent1">
-                  <a:tint val="66000"/>
-                  <a:satMod val="160000"/>
-                </a:schemeClr>
-              </a:gs>
-              <a:gs pos="50000">
-                <a:schemeClr val="accent1">
-                  <a:tint val="44500"/>
-                  <a:satMod val="160000"/>
-                </a:schemeClr>
-              </a:gs>
-              <a:gs pos="100000">
-                <a:schemeClr val="accent1">
-                  <a:tint val="23500"/>
-                  <a:satMod val="160000"/>
-                </a:schemeClr>
-              </a:gs>
-            </a:gsLst>
-            <a:path path="circle">
-              <a:fillToRect l="50000" t="50000" r="50000" b="50000"/>
-            </a:path>
-            <a:tileRect/>
-          </a:gradFill>
-        </p:spPr>
-        <p:txBody>
-          <a:bodyPr anchor="ctr"/>
-          <a:lstStyle/>
-          <a:p>
-            <a:pPr marL="0" indent="0">
-              <a:buNone/>
-            </a:pPr>
-            <a:r>
-              <a:rPr lang="en-US" dirty="0">
-                <a:latin typeface="Courier New" panose="02070309020205020404" pitchFamily="49" charset="0"/>
-                <a:cs typeface="Courier New" panose="02070309020205020404" pitchFamily="49" charset="0"/>
-              </a:rPr>
-              <a:t>CREATE TABLE students(</a:t>
-            </a:r>
-          </a:p>
-          <a:p>
-            <a:pPr marL="0" indent="0">
-              <a:buNone/>
-            </a:pPr>
-            <a:r>
-              <a:rPr lang="en-US" dirty="0">
-                <a:latin typeface="Courier New" panose="02070309020205020404" pitchFamily="49" charset="0"/>
-                <a:cs typeface="Courier New" panose="02070309020205020404" pitchFamily="49" charset="0"/>
-              </a:rPr>
-              <a:t>	id </a:t>
-            </a:r>
-            <a:r>
-              <a:rPr lang="en-US" dirty="0" err="1">
-                <a:latin typeface="Courier New" panose="02070309020205020404" pitchFamily="49" charset="0"/>
-                <a:cs typeface="Courier New" panose="02070309020205020404" pitchFamily="49" charset="0"/>
-              </a:rPr>
-              <a:t>Bigint</a:t>
-            </a:r>
-            <a:r>
-              <a:rPr lang="en-US" dirty="0">
-                <a:latin typeface="Courier New" panose="02070309020205020404" pitchFamily="49" charset="0"/>
-                <a:cs typeface="Courier New" panose="02070309020205020404" pitchFamily="49" charset="0"/>
-              </a:rPr>
-              <a:t>,</a:t>
-            </a:r>
-          </a:p>
-          <a:p>
-            <a:pPr marL="0" indent="0">
-              <a:buNone/>
-            </a:pPr>
-            <a:r>
-              <a:rPr lang="en-US" dirty="0">
-                <a:latin typeface="Courier New" panose="02070309020205020404" pitchFamily="49" charset="0"/>
-                <a:cs typeface="Courier New" panose="02070309020205020404" pitchFamily="49" charset="0"/>
-              </a:rPr>
-              <a:t>    name VARCHAR (13),</a:t>
-            </a:r>
-          </a:p>
-          <a:p>
-            <a:pPr marL="0" indent="0">
-              <a:buNone/>
-            </a:pPr>
-            <a:r>
-              <a:rPr lang="en-US" dirty="0">
-                <a:latin typeface="Courier New" panose="02070309020205020404" pitchFamily="49" charset="0"/>
-                <a:cs typeface="Courier New" panose="02070309020205020404" pitchFamily="49" charset="0"/>
-              </a:rPr>
-              <a:t>	</a:t>
-            </a:r>
-            <a:r>
-              <a:rPr lang="en-US" dirty="0" err="1">
-                <a:latin typeface="Courier New" panose="02070309020205020404" pitchFamily="49" charset="0"/>
-                <a:cs typeface="Courier New" panose="02070309020205020404" pitchFamily="49" charset="0"/>
-              </a:rPr>
-              <a:t>gpa</a:t>
-            </a:r>
-            <a:r>
-              <a:rPr lang="en-US" dirty="0">
-                <a:latin typeface="Courier New" panose="02070309020205020404" pitchFamily="49" charset="0"/>
-                <a:cs typeface="Courier New" panose="02070309020205020404" pitchFamily="49" charset="0"/>
-              </a:rPr>
-              <a:t> Decimal, </a:t>
-            </a:r>
-          </a:p>
-          <a:p>
-            <a:pPr marL="0" indent="0">
-              <a:buNone/>
-            </a:pPr>
-            <a:r>
-              <a:rPr lang="en-US" dirty="0">
-                <a:latin typeface="Courier New" panose="02070309020205020404" pitchFamily="49" charset="0"/>
-                <a:cs typeface="Courier New" panose="02070309020205020404" pitchFamily="49" charset="0"/>
-              </a:rPr>
-              <a:t>    PRIMARY KEY(id)</a:t>
-            </a:r>
-          </a:p>
-          <a:p>
-            <a:pPr marL="0" indent="0">
-              <a:buNone/>
-            </a:pPr>
-            <a:r>
-              <a:rPr lang="en-US" dirty="0">
-                <a:latin typeface="Courier New" panose="02070309020205020404" pitchFamily="49" charset="0"/>
-                <a:cs typeface="Courier New" panose="02070309020205020404" pitchFamily="49" charset="0"/>
-              </a:rPr>
-              <a:t>)</a:t>
-            </a:r>
-          </a:p>
-        </p:txBody>
-      </p:sp>
-      <p:sp>
-        <p:nvSpPr>
-          <p:cNvPr id="4" name="Slide Number Placeholder 3">
-            <a:extLst>
-              <a:ext uri="{FF2B5EF4-FFF2-40B4-BE49-F238E27FC236}">
-                <a16:creationId xmlns:a16="http://schemas.microsoft.com/office/drawing/2014/main" id="{D3B2FE8F-8A06-4000-B7E7-E145B5D43C32}"/>
-              </a:ext>
-            </a:extLst>
-          </p:cNvPr>
-          <p:cNvSpPr>
-            <a:spLocks noGrp="1"/>
-          </p:cNvSpPr>
-          <p:nvPr>
-            <p:ph type="sldNum" sz="quarter" idx="12"/>
-          </p:nvPr>
-        </p:nvSpPr>
-        <p:spPr/>
-        <p:txBody>
-          <a:bodyPr/>
-          <a:lstStyle/>
-          <a:p>
-            <a:fld id="{F6728BC2-ACA3-447C-A909-F3F49211C066}" type="slidenum">
-              <a:rPr lang="en-US" smtClean="0"/>
-              <a:pPr/>
-              <a:t>6</a:t>
-            </a:fld>
-            <a:endParaRPr lang="en-US" dirty="0"/>
-          </a:p>
-        </p:txBody>
-      </p:sp>
-    </p:spTree>
-    <p:extLst>
-      <p:ext uri="{BB962C8B-B14F-4D97-AF65-F5344CB8AC3E}">
-        <p14:creationId xmlns:p14="http://schemas.microsoft.com/office/powerpoint/2010/main" val="132639717"/>
-      </p:ext>
-    </p:extLst>
-  </p:cSld>
-  <p:clrMapOvr>
-    <a:masterClrMapping/>
-  </p:clrMapOvr>
-</p:sld>
-</file>
-
-<file path=ppt/slides/slide8.xml><?xml version="1.0" encoding="utf-8"?>
-<p:sld xmlns:a="http://schemas.openxmlformats.org/drawingml/2006/main" xmlns:r="http://schemas.openxmlformats.org/officeDocument/2006/relationships" xmlns:p="http://schemas.openxmlformats.org/presentationml/2006/main">
-  <p:cSld>
-    <p:spTree>
-      <p:nvGrpSpPr>
-        <p:cNvPr id="1" name=""/>
-        <p:cNvGrpSpPr/>
-        <p:nvPr/>
-      </p:nvGrpSpPr>
-      <p:grpSpPr>
-        <a:xfrm>
-          <a:off x="0" y="0"/>
-          <a:ext cx="0" cy="0"/>
-          <a:chOff x="0" y="0"/>
-          <a:chExt cx="0" cy="0"/>
-        </a:xfrm>
-      </p:grpSpPr>
-      <p:sp>
-        <p:nvSpPr>
-          <p:cNvPr id="2" name="Title 1">
-            <a:extLst>
-              <a:ext uri="{FF2B5EF4-FFF2-40B4-BE49-F238E27FC236}">
-                <a16:creationId xmlns:a16="http://schemas.microsoft.com/office/drawing/2014/main" id="{480B22A4-F8F5-41CA-9762-66518D4EBD58}"/>
-              </a:ext>
-            </a:extLst>
-          </p:cNvPr>
-          <p:cNvSpPr>
-            <a:spLocks noGrp="1"/>
-          </p:cNvSpPr>
-          <p:nvPr>
-            <p:ph type="title"/>
-          </p:nvPr>
-        </p:nvSpPr>
-        <p:spPr/>
-        <p:txBody>
-          <a:bodyPr/>
-          <a:lstStyle/>
-          <a:p>
-            <a:r>
-              <a:rPr lang="en-US" dirty="0"/>
-              <a:t>Data Definition Language</a:t>
-            </a:r>
-          </a:p>
-        </p:txBody>
-      </p:sp>
-      <p:sp>
-        <p:nvSpPr>
-          <p:cNvPr id="3" name="Content Placeholder 2">
-            <a:extLst>
-              <a:ext uri="{FF2B5EF4-FFF2-40B4-BE49-F238E27FC236}">
-                <a16:creationId xmlns:a16="http://schemas.microsoft.com/office/drawing/2014/main" id="{6448E8AB-E57B-4A0F-AF94-FA3ACB08B04F}"/>
-              </a:ext>
-            </a:extLst>
-          </p:cNvPr>
-          <p:cNvSpPr>
-            <a:spLocks noGrp="1"/>
-          </p:cNvSpPr>
-          <p:nvPr>
-            <p:ph idx="1"/>
-          </p:nvPr>
-        </p:nvSpPr>
-        <p:spPr/>
-        <p:txBody>
-          <a:bodyPr/>
-          <a:lstStyle/>
-          <a:p>
-            <a:r>
-              <a:rPr lang="en-US" dirty="0"/>
-              <a:t>Create </a:t>
-            </a:r>
-          </a:p>
-          <a:p>
-            <a:r>
-              <a:rPr lang="en-US" dirty="0"/>
-              <a:t>Alter</a:t>
-            </a:r>
-          </a:p>
-          <a:p>
-            <a:r>
-              <a:rPr lang="en-US" dirty="0"/>
-              <a:t>Drop</a:t>
-            </a:r>
-          </a:p>
-          <a:p>
-            <a:r>
-              <a:rPr lang="en-US" dirty="0"/>
-              <a:t>Truncate </a:t>
-            </a:r>
-          </a:p>
-          <a:p>
-            <a:r>
-              <a:rPr lang="en-US" dirty="0"/>
-              <a:t>***Rename</a:t>
-            </a:r>
-          </a:p>
-          <a:p>
-            <a:pPr lvl="1"/>
-            <a:r>
-              <a:rPr lang="en-US" dirty="0"/>
-              <a:t>In PostgreSQL just </a:t>
-            </a:r>
-            <a:r>
-              <a:rPr lang="en-US" dirty="0">
-                <a:latin typeface="Courier New" panose="02070309020205020404" pitchFamily="49" charset="0"/>
-                <a:cs typeface="Courier New" panose="02070309020205020404" pitchFamily="49" charset="0"/>
-              </a:rPr>
-              <a:t>ALTER TABLE </a:t>
-            </a:r>
-            <a:r>
-              <a:rPr lang="en-US" i="1" dirty="0">
-                <a:latin typeface="Courier New" panose="02070309020205020404" pitchFamily="49" charset="0"/>
-                <a:cs typeface="Courier New" panose="02070309020205020404" pitchFamily="49" charset="0"/>
-              </a:rPr>
-              <a:t>name </a:t>
-            </a:r>
-            <a:r>
-              <a:rPr lang="en-US" dirty="0">
-                <a:latin typeface="Courier New" panose="02070309020205020404" pitchFamily="49" charset="0"/>
-                <a:cs typeface="Courier New" panose="02070309020205020404" pitchFamily="49" charset="0"/>
-              </a:rPr>
-              <a:t>RENAME TO </a:t>
-            </a:r>
-            <a:r>
-              <a:rPr lang="en-US" i="1" dirty="0" err="1">
-                <a:latin typeface="Courier New" panose="02070309020205020404" pitchFamily="49" charset="0"/>
-                <a:cs typeface="Courier New" panose="02070309020205020404" pitchFamily="49" charset="0"/>
-              </a:rPr>
-              <a:t>new_name</a:t>
-            </a:r>
-            <a:r>
-              <a:rPr lang="en-US" i="1" dirty="0">
-                <a:latin typeface="Courier New" panose="02070309020205020404" pitchFamily="49" charset="0"/>
-                <a:cs typeface="Courier New" panose="02070309020205020404" pitchFamily="49" charset="0"/>
-              </a:rPr>
-              <a:t>;</a:t>
-            </a:r>
-            <a:endParaRPr lang="en-US" dirty="0">
-              <a:latin typeface="Courier New" panose="02070309020205020404" pitchFamily="49" charset="0"/>
-              <a:cs typeface="Courier New" panose="02070309020205020404" pitchFamily="49" charset="0"/>
-            </a:endParaRPr>
-          </a:p>
-          <a:p>
-            <a:r>
-              <a:rPr lang="en-US" dirty="0"/>
-              <a:t>Comment </a:t>
-            </a:r>
-          </a:p>
-          <a:p>
-            <a:endParaRPr lang="en-US" dirty="0"/>
-          </a:p>
-        </p:txBody>
-      </p:sp>
-      <p:sp>
-        <p:nvSpPr>
-          <p:cNvPr id="4" name="Slide Number Placeholder 3">
-            <a:extLst>
-              <a:ext uri="{FF2B5EF4-FFF2-40B4-BE49-F238E27FC236}">
-                <a16:creationId xmlns:a16="http://schemas.microsoft.com/office/drawing/2014/main" id="{DFCD860D-D52C-4DD3-AA21-4964446F48BC}"/>
-              </a:ext>
-            </a:extLst>
-          </p:cNvPr>
-          <p:cNvSpPr>
-            <a:spLocks noGrp="1"/>
-          </p:cNvSpPr>
-          <p:nvPr>
-            <p:ph type="sldNum" sz="quarter" idx="12"/>
-          </p:nvPr>
-        </p:nvSpPr>
-        <p:spPr/>
-        <p:txBody>
-          <a:bodyPr/>
-          <a:lstStyle/>
-          <a:p>
-            <a:fld id="{F6728BC2-ACA3-447C-A909-F3F49211C066}" type="slidenum">
-              <a:rPr lang="en-US" smtClean="0"/>
-              <a:pPr/>
-              <a:t>7</a:t>
-            </a:fld>
-            <a:endParaRPr lang="en-US" dirty="0"/>
-          </a:p>
-        </p:txBody>
-      </p:sp>
-    </p:spTree>
-    <p:extLst>
-      <p:ext uri="{BB962C8B-B14F-4D97-AF65-F5344CB8AC3E}">
-        <p14:creationId xmlns:p14="http://schemas.microsoft.com/office/powerpoint/2010/main" val="2172402417"/>
-      </p:ext>
-    </p:extLst>
-  </p:cSld>
-  <p:clrMapOvr>
-    <a:masterClrMapping/>
-  </p:clrMapOvr>
-</p:sld>
-</file>
-
-<file path=ppt/slides/slide9.xml><?xml version="1.0" encoding="utf-8"?>
-<p:sld xmlns:a="http://schemas.openxmlformats.org/drawingml/2006/main" xmlns:r="http://schemas.openxmlformats.org/officeDocument/2006/relationships" xmlns:p="http://schemas.openxmlformats.org/presentationml/2006/main">
-  <p:cSld>
-    <p:spTree>
-      <p:nvGrpSpPr>
-        <p:cNvPr id="1" name=""/>
-        <p:cNvGrpSpPr/>
-        <p:nvPr/>
-      </p:nvGrpSpPr>
-      <p:grpSpPr>
-        <a:xfrm>
-          <a:off x="0" y="0"/>
-          <a:ext cx="0" cy="0"/>
-          <a:chOff x="0" y="0"/>
-          <a:chExt cx="0" cy="0"/>
-        </a:xfrm>
-      </p:grpSpPr>
-      <p:sp>
-        <p:nvSpPr>
-          <p:cNvPr id="2" name="Title 1">
-            <a:extLst>
-              <a:ext uri="{FF2B5EF4-FFF2-40B4-BE49-F238E27FC236}">
-                <a16:creationId xmlns:a16="http://schemas.microsoft.com/office/drawing/2014/main" id="{7CCF564B-6AEC-4F88-A0FA-37A822D47E94}"/>
-              </a:ext>
-            </a:extLst>
-          </p:cNvPr>
-          <p:cNvSpPr>
-            <a:spLocks noGrp="1"/>
-          </p:cNvSpPr>
-          <p:nvPr>
-            <p:ph type="title"/>
-          </p:nvPr>
-        </p:nvSpPr>
-        <p:spPr/>
-        <p:txBody>
-          <a:bodyPr/>
-          <a:lstStyle/>
-          <a:p>
-            <a:r>
-              <a:rPr lang="en-US" dirty="0"/>
-              <a:t>Helpful Resources </a:t>
-            </a:r>
-            <a:br>
-              <a:rPr lang="en-US" dirty="0"/>
-            </a:br>
-            <a:r>
-              <a:rPr lang="en-US" sz="1200" dirty="0"/>
-              <a:t>(Beyond the documentation)</a:t>
-            </a:r>
-            <a:endParaRPr lang="en-US" dirty="0"/>
-          </a:p>
-        </p:txBody>
-      </p:sp>
-      <p:sp>
-        <p:nvSpPr>
-          <p:cNvPr id="3" name="Content Placeholder 2">
-            <a:extLst>
-              <a:ext uri="{FF2B5EF4-FFF2-40B4-BE49-F238E27FC236}">
-                <a16:creationId xmlns:a16="http://schemas.microsoft.com/office/drawing/2014/main" id="{BDC4863A-943F-449C-A8B3-5AE00BF4E69B}"/>
-              </a:ext>
-            </a:extLst>
-          </p:cNvPr>
-          <p:cNvSpPr>
-            <a:spLocks noGrp="1"/>
-          </p:cNvSpPr>
-          <p:nvPr>
-            <p:ph idx="1"/>
-          </p:nvPr>
-        </p:nvSpPr>
-        <p:spPr/>
-        <p:txBody>
-          <a:bodyPr/>
-          <a:lstStyle/>
-          <a:p>
-            <a:r>
-              <a:rPr lang="en-US" dirty="0">
-                <a:hlinkClick r:id="rId2"/>
-              </a:rPr>
-              <a:t>https://www.techonthenet.com/postgresql/tables/create_table.php</a:t>
-            </a:r>
-            <a:endParaRPr lang="en-US" dirty="0"/>
-          </a:p>
-          <a:p>
-            <a:r>
-              <a:rPr lang="en-US" dirty="0">
-                <a:hlinkClick r:id="rId3"/>
-              </a:rPr>
-              <a:t>https://www.postgresqltutorial.com/</a:t>
-            </a:r>
-            <a:endParaRPr lang="en-US" dirty="0"/>
-          </a:p>
-          <a:p>
-            <a:r>
-              <a:rPr lang="en-US" dirty="0">
-                <a:hlinkClick r:id="rId4"/>
-              </a:rPr>
-              <a:t>https://www.tutorialspoint.com/postgresql/postgresql_syntax.htm</a:t>
-            </a:r>
-            <a:endParaRPr lang="en-US" dirty="0"/>
-          </a:p>
-          <a:p>
-            <a:endParaRPr lang="en-US" dirty="0"/>
-          </a:p>
-        </p:txBody>
-      </p:sp>
-      <p:sp>
-        <p:nvSpPr>
-          <p:cNvPr id="4" name="Slide Number Placeholder 3">
-            <a:extLst>
-              <a:ext uri="{FF2B5EF4-FFF2-40B4-BE49-F238E27FC236}">
-                <a16:creationId xmlns:a16="http://schemas.microsoft.com/office/drawing/2014/main" id="{9FD39B28-D937-4A5F-A13E-28B2D5E73613}"/>
-              </a:ext>
-            </a:extLst>
-          </p:cNvPr>
-          <p:cNvSpPr>
-            <a:spLocks noGrp="1"/>
-          </p:cNvSpPr>
-          <p:nvPr>
-            <p:ph type="sldNum" sz="quarter" idx="12"/>
-          </p:nvPr>
-        </p:nvSpPr>
-        <p:spPr/>
-        <p:txBody>
-          <a:bodyPr/>
-          <a:lstStyle/>
-          <a:p>
-            <a:fld id="{F6728BC2-ACA3-447C-A909-F3F49211C066}" type="slidenum">
-              <a:rPr lang="en-US" smtClean="0"/>
-              <a:pPr/>
-              <a:t>8</a:t>
-            </a:fld>
-            <a:endParaRPr lang="en-US" dirty="0"/>
-          </a:p>
-        </p:txBody>
-      </p:sp>
-    </p:spTree>
-    <p:extLst>
-      <p:ext uri="{BB962C8B-B14F-4D97-AF65-F5344CB8AC3E}">
-        <p14:creationId xmlns:p14="http://schemas.microsoft.com/office/powerpoint/2010/main" val="3858159054"/>
       </p:ext>
     </p:extLst>
   </p:cSld>

</xml_diff>